<commit_message>
updated pptx with all planned slides, with outline + notes
</commit_message>
<xml_diff>
--- a/_presentations/CodeFirstMigrations.pptx
+++ b/_presentations/CodeFirstMigrations.pptx
@@ -6,10 +6,20 @@
   </p:sldMasterIdLst>
   <p:sldIdLst>
     <p:sldId id="256" r:id="rId2"/>
-    <p:sldId id="258" r:id="rId3"/>
+    <p:sldId id="261" r:id="rId3"/>
     <p:sldId id="259" r:id="rId4"/>
-    <p:sldId id="260" r:id="rId5"/>
-    <p:sldId id="257" r:id="rId6"/>
+    <p:sldId id="262" r:id="rId5"/>
+    <p:sldId id="263" r:id="rId6"/>
+    <p:sldId id="264" r:id="rId7"/>
+    <p:sldId id="265" r:id="rId8"/>
+    <p:sldId id="266" r:id="rId9"/>
+    <p:sldId id="267" r:id="rId10"/>
+    <p:sldId id="268" r:id="rId11"/>
+    <p:sldId id="269" r:id="rId12"/>
+    <p:sldId id="270" r:id="rId13"/>
+    <p:sldId id="260" r:id="rId14"/>
+    <p:sldId id="258" r:id="rId15"/>
+    <p:sldId id="257" r:id="rId16"/>
   </p:sldIdLst>
   <p:sldSz cx="9144000" cy="6858000" type="screen4x3"/>
   <p:notesSz cx="6858000" cy="9144000"/>
@@ -140,7 +150,7 @@
   </p:defaultTextStyle>
   <p:extLst>
     <p:ext uri="{EFAFB233-063F-42B5-8137-9DF3F51BA10A}">
-      <p15:sldGuideLst xmlns:p15="http://schemas.microsoft.com/office/powerpoint/2012/main" xmlns="">
+      <p15:sldGuideLst xmlns="" xmlns:p15="http://schemas.microsoft.com/office/powerpoint/2012/main">
         <p15:guide id="1" orient="horz" pos="2160">
           <p15:clr>
             <a:srgbClr val="A4A3A4"/>
@@ -154,7 +164,7 @@
       </p15:sldGuideLst>
     </p:ext>
     <p:ext uri="{2D200454-40CA-4A62-9FC3-DE9A4176ACB9}">
-      <p15:notesGuideLst xmlns:p15="http://schemas.microsoft.com/office/powerpoint/2012/main" xmlns="">
+      <p15:notesGuideLst xmlns="" xmlns:p15="http://schemas.microsoft.com/office/powerpoint/2012/main">
         <p15:guide id="1" orient="horz" pos="2880">
           <p15:clr>
             <a:srgbClr val="A4A3A4"/>
@@ -1375,6 +1385,546 @@
 </p:sld>
 </file>
 
+<file path=ppt/slides/slide10.xml><?xml version="1.0" encoding="utf-8"?>
+<p:sld xmlns:a="http://schemas.openxmlformats.org/drawingml/2006/main" xmlns:r="http://schemas.openxmlformats.org/officeDocument/2006/relationships" xmlns:p="http://schemas.openxmlformats.org/presentationml/2006/main">
+  <p:cSld>
+    <p:spTree>
+      <p:nvGrpSpPr>
+        <p:cNvPr id="1" name=""/>
+        <p:cNvGrpSpPr/>
+        <p:nvPr/>
+      </p:nvGrpSpPr>
+      <p:grpSpPr>
+        <a:xfrm>
+          <a:off x="0" y="0"/>
+          <a:ext cx="0" cy="0"/>
+          <a:chOff x="0" y="0"/>
+          <a:chExt cx="0" cy="0"/>
+        </a:xfrm>
+      </p:grpSpPr>
+      <p:sp>
+        <p:nvSpPr>
+          <p:cNvPr id="2" name="Title 1"/>
+          <p:cNvSpPr>
+            <a:spLocks noGrp="1"/>
+          </p:cNvSpPr>
+          <p:nvPr>
+            <p:ph type="title"/>
+          </p:nvPr>
+        </p:nvSpPr>
+        <p:spPr/>
+        <p:txBody>
+          <a:bodyPr/>
+          <a:lstStyle/>
+          <a:p>
+            <a:r>
+              <a:rPr lang="en-US" dirty="0"/>
+              <a:t>6</a:t>
+            </a:r>
+            <a:r>
+              <a:rPr lang="en-US" dirty="0" smtClean="0"/>
+              <a:t> of 6: </a:t>
+            </a:r>
+            <a:endParaRPr lang="en-US" dirty="0"/>
+          </a:p>
+        </p:txBody>
+      </p:sp>
+      <p:sp>
+        <p:nvSpPr>
+          <p:cNvPr id="3" name="Content Placeholder 2"/>
+          <p:cNvSpPr>
+            <a:spLocks noGrp="1"/>
+          </p:cNvSpPr>
+          <p:nvPr>
+            <p:ph idx="1"/>
+          </p:nvPr>
+        </p:nvSpPr>
+        <p:spPr/>
+        <p:txBody>
+          <a:bodyPr/>
+          <a:lstStyle/>
+          <a:p>
+            <a:r>
+              <a:rPr lang="en-US" dirty="0" smtClean="0"/>
+              <a:t>Process Workflow</a:t>
+            </a:r>
+          </a:p>
+          <a:p>
+            <a:r>
+              <a:rPr lang="en-US" dirty="0" smtClean="0"/>
+              <a:t>Handle existing database</a:t>
+            </a:r>
+          </a:p>
+          <a:p>
+            <a:r>
+              <a:rPr lang="en-US" dirty="0" smtClean="0"/>
+              <a:t>Comply with enterprise requirements</a:t>
+            </a:r>
+            <a:endParaRPr lang="en-US" dirty="0"/>
+          </a:p>
+        </p:txBody>
+      </p:sp>
+    </p:spTree>
+    <p:extLst>
+      <p:ext uri="{BB962C8B-B14F-4D97-AF65-F5344CB8AC3E}">
+        <p14:creationId xmlns:p14="http://schemas.microsoft.com/office/powerpoint/2010/main" val="3114339337"/>
+      </p:ext>
+    </p:extLst>
+  </p:cSld>
+  <p:clrMapOvr>
+    <a:masterClrMapping/>
+  </p:clrMapOvr>
+</p:sld>
+</file>
+
+<file path=ppt/slides/slide11.xml><?xml version="1.0" encoding="utf-8"?>
+<p:sld xmlns:a="http://schemas.openxmlformats.org/drawingml/2006/main" xmlns:r="http://schemas.openxmlformats.org/officeDocument/2006/relationships" xmlns:p="http://schemas.openxmlformats.org/presentationml/2006/main">
+  <p:cSld>
+    <p:spTree>
+      <p:nvGrpSpPr>
+        <p:cNvPr id="1" name=""/>
+        <p:cNvGrpSpPr/>
+        <p:nvPr/>
+      </p:nvGrpSpPr>
+      <p:grpSpPr>
+        <a:xfrm>
+          <a:off x="0" y="0"/>
+          <a:ext cx="0" cy="0"/>
+          <a:chOff x="0" y="0"/>
+          <a:chExt cx="0" cy="0"/>
+        </a:xfrm>
+      </p:grpSpPr>
+      <p:sp>
+        <p:nvSpPr>
+          <p:cNvPr id="2" name="Title 1"/>
+          <p:cNvSpPr>
+            <a:spLocks noGrp="1"/>
+          </p:cNvSpPr>
+          <p:nvPr>
+            <p:ph type="title"/>
+          </p:nvPr>
+        </p:nvSpPr>
+        <p:spPr/>
+        <p:txBody>
+          <a:bodyPr/>
+          <a:lstStyle/>
+          <a:p>
+            <a:r>
+              <a:rPr lang="en-US" dirty="0" smtClean="0"/>
+              <a:t>Self-Correcting Worksheet</a:t>
+            </a:r>
+            <a:endParaRPr lang="en-US" dirty="0"/>
+          </a:p>
+        </p:txBody>
+      </p:sp>
+      <p:sp>
+        <p:nvSpPr>
+          <p:cNvPr id="3" name="Content Placeholder 2"/>
+          <p:cNvSpPr>
+            <a:spLocks noGrp="1"/>
+          </p:cNvSpPr>
+          <p:nvPr>
+            <p:ph idx="1"/>
+          </p:nvPr>
+        </p:nvSpPr>
+        <p:spPr/>
+        <p:txBody>
+          <a:bodyPr/>
+          <a:lstStyle/>
+          <a:p>
+            <a:r>
+              <a:rPr lang="en-US" dirty="0" smtClean="0"/>
+              <a:t>Fill in the blanks (if time permits)</a:t>
+            </a:r>
+            <a:endParaRPr lang="en-US" dirty="0"/>
+          </a:p>
+        </p:txBody>
+      </p:sp>
+    </p:spTree>
+    <p:extLst>
+      <p:ext uri="{BB962C8B-B14F-4D97-AF65-F5344CB8AC3E}">
+        <p14:creationId xmlns:p14="http://schemas.microsoft.com/office/powerpoint/2010/main" val="1884935358"/>
+      </p:ext>
+    </p:extLst>
+  </p:cSld>
+  <p:clrMapOvr>
+    <a:masterClrMapping/>
+  </p:clrMapOvr>
+</p:sld>
+</file>
+
+<file path=ppt/slides/slide12.xml><?xml version="1.0" encoding="utf-8"?>
+<p:sld xmlns:a="http://schemas.openxmlformats.org/drawingml/2006/main" xmlns:r="http://schemas.openxmlformats.org/officeDocument/2006/relationships" xmlns:p="http://schemas.openxmlformats.org/presentationml/2006/main">
+  <p:cSld>
+    <p:spTree>
+      <p:nvGrpSpPr>
+        <p:cNvPr id="1" name=""/>
+        <p:cNvGrpSpPr/>
+        <p:nvPr/>
+      </p:nvGrpSpPr>
+      <p:grpSpPr>
+        <a:xfrm>
+          <a:off x="0" y="0"/>
+          <a:ext cx="0" cy="0"/>
+          <a:chOff x="0" y="0"/>
+          <a:chExt cx="0" cy="0"/>
+        </a:xfrm>
+      </p:grpSpPr>
+      <p:sp>
+        <p:nvSpPr>
+          <p:cNvPr id="2" name="Title 1"/>
+          <p:cNvSpPr>
+            <a:spLocks noGrp="1"/>
+          </p:cNvSpPr>
+          <p:nvPr>
+            <p:ph type="title"/>
+          </p:nvPr>
+        </p:nvSpPr>
+        <p:spPr/>
+        <p:txBody>
+          <a:bodyPr/>
+          <a:lstStyle/>
+          <a:p>
+            <a:r>
+              <a:rPr lang="en-US" dirty="0" smtClean="0"/>
+              <a:t>Code Walkthrough</a:t>
+            </a:r>
+            <a:endParaRPr lang="en-US" dirty="0"/>
+          </a:p>
+        </p:txBody>
+      </p:sp>
+      <p:sp>
+        <p:nvSpPr>
+          <p:cNvPr id="3" name="Content Placeholder 2"/>
+          <p:cNvSpPr>
+            <a:spLocks noGrp="1"/>
+          </p:cNvSpPr>
+          <p:nvPr>
+            <p:ph idx="1"/>
+          </p:nvPr>
+        </p:nvSpPr>
+        <p:spPr/>
+        <p:txBody>
+          <a:bodyPr/>
+          <a:lstStyle/>
+          <a:p>
+            <a:r>
+              <a:rPr lang="en-US" dirty="0" smtClean="0"/>
+              <a:t>Visual 2012</a:t>
+            </a:r>
+          </a:p>
+          <a:p>
+            <a:r>
+              <a:rPr lang="en-US" dirty="0" smtClean="0"/>
+              <a:t>Add new field in Model</a:t>
+            </a:r>
+          </a:p>
+          <a:p>
+            <a:r>
+              <a:rPr lang="en-US" dirty="0" smtClean="0"/>
+              <a:t>Add a Migration</a:t>
+            </a:r>
+          </a:p>
+          <a:p>
+            <a:r>
+              <a:rPr lang="en-US" dirty="0" smtClean="0"/>
+              <a:t>Update Database</a:t>
+            </a:r>
+            <a:endParaRPr lang="en-US" dirty="0"/>
+          </a:p>
+        </p:txBody>
+      </p:sp>
+    </p:spTree>
+    <p:extLst>
+      <p:ext uri="{BB962C8B-B14F-4D97-AF65-F5344CB8AC3E}">
+        <p14:creationId xmlns:p14="http://schemas.microsoft.com/office/powerpoint/2010/main" val="925839632"/>
+      </p:ext>
+    </p:extLst>
+  </p:cSld>
+  <p:clrMapOvr>
+    <a:masterClrMapping/>
+  </p:clrMapOvr>
+</p:sld>
+</file>
+
+<file path=ppt/slides/slide13.xml><?xml version="1.0" encoding="utf-8"?>
+<p:sld xmlns:a="http://schemas.openxmlformats.org/drawingml/2006/main" xmlns:r="http://schemas.openxmlformats.org/officeDocument/2006/relationships" xmlns:p="http://schemas.openxmlformats.org/presentationml/2006/main">
+  <p:cSld>
+    <p:spTree>
+      <p:nvGrpSpPr>
+        <p:cNvPr id="1" name=""/>
+        <p:cNvGrpSpPr/>
+        <p:nvPr/>
+      </p:nvGrpSpPr>
+      <p:grpSpPr>
+        <a:xfrm>
+          <a:off x="0" y="0"/>
+          <a:ext cx="0" cy="0"/>
+          <a:chOff x="0" y="0"/>
+          <a:chExt cx="0" cy="0"/>
+        </a:xfrm>
+      </p:grpSpPr>
+      <p:sp>
+        <p:nvSpPr>
+          <p:cNvPr id="2" name="Title 1"/>
+          <p:cNvSpPr>
+            <a:spLocks noGrp="1"/>
+          </p:cNvSpPr>
+          <p:nvPr>
+            <p:ph type="title"/>
+          </p:nvPr>
+        </p:nvSpPr>
+        <p:spPr/>
+        <p:txBody>
+          <a:bodyPr/>
+          <a:lstStyle/>
+          <a:p>
+            <a:r>
+              <a:rPr lang="en-US" dirty="0" smtClean="0"/>
+              <a:t>Conclusion</a:t>
+            </a:r>
+            <a:endParaRPr lang="en-US" dirty="0"/>
+          </a:p>
+        </p:txBody>
+      </p:sp>
+      <p:sp>
+        <p:nvSpPr>
+          <p:cNvPr id="3" name="Content Placeholder 2"/>
+          <p:cNvSpPr>
+            <a:spLocks noGrp="1"/>
+          </p:cNvSpPr>
+          <p:nvPr>
+            <p:ph idx="1"/>
+          </p:nvPr>
+        </p:nvSpPr>
+        <p:spPr/>
+        <p:txBody>
+          <a:bodyPr/>
+          <a:lstStyle/>
+          <a:p>
+            <a:r>
+              <a:rPr lang="en-US" dirty="0" smtClean="0"/>
+              <a:t>Code First Migrations allows:</a:t>
+            </a:r>
+          </a:p>
+          <a:p>
+            <a:pPr lvl="1"/>
+            <a:r>
+              <a:rPr lang="en-US" dirty="0" smtClean="0"/>
+              <a:t>Continuous development</a:t>
+            </a:r>
+          </a:p>
+          <a:p>
+            <a:pPr lvl="1"/>
+            <a:r>
+              <a:rPr lang="en-US" dirty="0" smtClean="0"/>
+              <a:t>Synchronization among team members</a:t>
+            </a:r>
+          </a:p>
+          <a:p>
+            <a:pPr lvl="1"/>
+            <a:r>
+              <a:rPr lang="en-US" dirty="0" smtClean="0"/>
+              <a:t>Database versioning</a:t>
+            </a:r>
+          </a:p>
+          <a:p>
+            <a:pPr lvl="1"/>
+            <a:r>
+              <a:rPr lang="en-US" dirty="0" smtClean="0"/>
+              <a:t>Server deployment</a:t>
+            </a:r>
+          </a:p>
+          <a:p>
+            <a:pPr marL="457200" lvl="1" indent="0">
+              <a:buNone/>
+            </a:pPr>
+            <a:endParaRPr lang="en-US" dirty="0"/>
+          </a:p>
+          <a:p>
+            <a:pPr marL="457200" lvl="1" indent="0">
+              <a:buNone/>
+            </a:pPr>
+            <a:r>
+              <a:rPr lang="en-US" dirty="0" smtClean="0"/>
+              <a:t>(diagram with star pattern)</a:t>
+            </a:r>
+            <a:endParaRPr lang="en-US" dirty="0"/>
+          </a:p>
+        </p:txBody>
+      </p:sp>
+    </p:spTree>
+    <p:extLst>
+      <p:ext uri="{BB962C8B-B14F-4D97-AF65-F5344CB8AC3E}">
+        <p14:creationId xmlns:p14="http://schemas.microsoft.com/office/powerpoint/2010/main" val="1450648149"/>
+      </p:ext>
+    </p:extLst>
+  </p:cSld>
+  <p:clrMapOvr>
+    <a:masterClrMapping/>
+  </p:clrMapOvr>
+</p:sld>
+</file>
+
+<file path=ppt/slides/slide14.xml><?xml version="1.0" encoding="utf-8"?>
+<p:sld xmlns:a="http://schemas.openxmlformats.org/drawingml/2006/main" xmlns:r="http://schemas.openxmlformats.org/officeDocument/2006/relationships" xmlns:p="http://schemas.openxmlformats.org/presentationml/2006/main">
+  <p:cSld>
+    <p:spTree>
+      <p:nvGrpSpPr>
+        <p:cNvPr id="1" name=""/>
+        <p:cNvGrpSpPr/>
+        <p:nvPr/>
+      </p:nvGrpSpPr>
+      <p:grpSpPr>
+        <a:xfrm>
+          <a:off x="0" y="0"/>
+          <a:ext cx="0" cy="0"/>
+          <a:chOff x="0" y="0"/>
+          <a:chExt cx="0" cy="0"/>
+        </a:xfrm>
+      </p:grpSpPr>
+      <p:sp>
+        <p:nvSpPr>
+          <p:cNvPr id="2" name="Title 1"/>
+          <p:cNvSpPr>
+            <a:spLocks noGrp="1"/>
+          </p:cNvSpPr>
+          <p:nvPr>
+            <p:ph type="title"/>
+          </p:nvPr>
+        </p:nvSpPr>
+        <p:spPr/>
+        <p:txBody>
+          <a:bodyPr/>
+          <a:lstStyle/>
+          <a:p>
+            <a:r>
+              <a:rPr lang="en-US" dirty="0" smtClean="0"/>
+              <a:t>About Me</a:t>
+            </a:r>
+            <a:endParaRPr lang="en-US" dirty="0"/>
+          </a:p>
+        </p:txBody>
+      </p:sp>
+      <p:sp>
+        <p:nvSpPr>
+          <p:cNvPr id="3" name="Content Placeholder 2"/>
+          <p:cNvSpPr>
+            <a:spLocks noGrp="1"/>
+          </p:cNvSpPr>
+          <p:nvPr>
+            <p:ph idx="1"/>
+          </p:nvPr>
+        </p:nvSpPr>
+        <p:spPr/>
+        <p:txBody>
+          <a:bodyPr/>
+          <a:lstStyle/>
+          <a:p>
+            <a:pPr marL="0" indent="0">
+              <a:buNone/>
+            </a:pPr>
+            <a:r>
+              <a:rPr lang="en-US" dirty="0" smtClean="0"/>
+              <a:t>Shahed Chowdhuri</a:t>
+            </a:r>
+          </a:p>
+          <a:p>
+            <a:r>
+              <a:rPr lang="en-US" dirty="0" smtClean="0"/>
+              <a:t>Senior Consultant, </a:t>
+            </a:r>
+            <a:r>
+              <a:rPr lang="en-US" dirty="0" smtClean="0"/>
+              <a:t>Excella Consulting</a:t>
+            </a:r>
+          </a:p>
+          <a:p>
+            <a:r>
+              <a:rPr lang="en-US" dirty="0" smtClean="0"/>
+              <a:t>Email: </a:t>
+            </a:r>
+            <a:r>
+              <a:rPr lang="en-US" dirty="0" smtClean="0">
+                <a:hlinkClick r:id="rId2"/>
+              </a:rPr>
+              <a:t>shahed.chowdhuri@excella.com</a:t>
+            </a:r>
+            <a:endParaRPr lang="en-US" dirty="0" smtClean="0"/>
+          </a:p>
+          <a:p>
+            <a:r>
+              <a:rPr lang="en-US" dirty="0" smtClean="0"/>
+              <a:t>Twitter: @</a:t>
+            </a:r>
+            <a:r>
+              <a:rPr lang="en-US" dirty="0" err="1" smtClean="0"/>
+              <a:t>shahedc</a:t>
+            </a:r>
+            <a:endParaRPr lang="en-US" dirty="0" smtClean="0"/>
+          </a:p>
+          <a:p>
+            <a:r>
+              <a:rPr lang="en-US" dirty="0" smtClean="0"/>
+              <a:t>Blog: </a:t>
+            </a:r>
+            <a:r>
+              <a:rPr lang="en-US" dirty="0" smtClean="0">
+                <a:hlinkClick r:id="rId3"/>
+              </a:rPr>
+              <a:t>http://WakeUpAndCode.com</a:t>
+            </a:r>
+            <a:r>
+              <a:rPr lang="en-US" dirty="0" smtClean="0"/>
+              <a:t> </a:t>
+            </a:r>
+            <a:endParaRPr lang="en-US" dirty="0"/>
+          </a:p>
+        </p:txBody>
+      </p:sp>
+    </p:spTree>
+    <p:extLst>
+      <p:ext uri="{BB962C8B-B14F-4D97-AF65-F5344CB8AC3E}">
+        <p14:creationId xmlns:p14="http://schemas.microsoft.com/office/powerpoint/2010/main" val="2288945912"/>
+      </p:ext>
+    </p:extLst>
+  </p:cSld>
+  <p:clrMapOvr>
+    <a:masterClrMapping/>
+  </p:clrMapOvr>
+</p:sld>
+</file>
+
+<file path=ppt/slides/slide15.xml><?xml version="1.0" encoding="utf-8"?>
+<p:sld xmlns:a="http://schemas.openxmlformats.org/drawingml/2006/main" xmlns:r="http://schemas.openxmlformats.org/officeDocument/2006/relationships" xmlns:p="http://schemas.openxmlformats.org/presentationml/2006/main">
+  <p:cSld>
+    <p:spTree>
+      <p:nvGrpSpPr>
+        <p:cNvPr id="1" name=""/>
+        <p:cNvGrpSpPr/>
+        <p:nvPr/>
+      </p:nvGrpSpPr>
+      <p:grpSpPr>
+        <a:xfrm>
+          <a:off x="0" y="0"/>
+          <a:ext cx="0" cy="0"/>
+          <a:chOff x="0" y="0"/>
+          <a:chExt cx="0" cy="0"/>
+        </a:xfrm>
+      </p:grpSpPr>
+    </p:spTree>
+    <p:extLst>
+      <p:ext uri="{BB962C8B-B14F-4D97-AF65-F5344CB8AC3E}">
+        <p14:creationId xmlns:p14="http://schemas.microsoft.com/office/powerpoint/2010/main" val="2404542755"/>
+      </p:ext>
+    </p:extLst>
+  </p:cSld>
+  <p:clrMapOvr>
+    <a:masterClrMapping/>
+  </p:clrMapOvr>
+</p:sld>
+</file>
+
 <file path=ppt/slides/slide2.xml><?xml version="1.0" encoding="utf-8"?>
 <p:sld xmlns:a="http://schemas.openxmlformats.org/drawingml/2006/main" xmlns:r="http://schemas.openxmlformats.org/officeDocument/2006/relationships" xmlns:p="http://schemas.openxmlformats.org/presentationml/2006/main">
   <p:cSld>
@@ -1409,7 +1959,7 @@
           <a:p>
             <a:r>
               <a:rPr lang="en-US" dirty="0" smtClean="0"/>
-              <a:t>Introduction</a:t>
+              <a:t>Tech Check</a:t>
             </a:r>
             <a:endParaRPr lang="en-US" dirty="0"/>
           </a:p>
@@ -1430,14 +1980,58 @@
           <a:bodyPr/>
           <a:lstStyle/>
           <a:p>
-            <a:endParaRPr lang="en-US"/>
+            <a:r>
+              <a:rPr lang="en-US" dirty="0" smtClean="0"/>
+              <a:t>Are you familiar with:</a:t>
+            </a:r>
+          </a:p>
+          <a:p>
+            <a:pPr lvl="1"/>
+            <a:r>
+              <a:rPr lang="en-US" dirty="0" smtClean="0"/>
+              <a:t>ASP.NET MVC?</a:t>
+            </a:r>
+          </a:p>
+          <a:p>
+            <a:pPr lvl="1"/>
+            <a:r>
+              <a:rPr lang="en-US" dirty="0" smtClean="0"/>
+              <a:t>Entity Framework?</a:t>
+            </a:r>
+          </a:p>
+          <a:p>
+            <a:pPr lvl="1"/>
+            <a:r>
+              <a:rPr lang="en-US" dirty="0" smtClean="0"/>
+              <a:t>Code First development?</a:t>
+            </a:r>
+          </a:p>
+          <a:p>
+            <a:pPr lvl="1"/>
+            <a:r>
+              <a:rPr lang="en-US" dirty="0" smtClean="0"/>
+              <a:t>Code First Migrations?</a:t>
+            </a:r>
+          </a:p>
+          <a:p>
+            <a:pPr lvl="1"/>
+            <a:endParaRPr lang="en-US" dirty="0"/>
+          </a:p>
+          <a:p>
+            <a:pPr marL="457200" lvl="1" indent="0">
+              <a:buNone/>
+            </a:pPr>
+            <a:r>
+              <a:rPr lang="en-US" dirty="0" smtClean="0"/>
+              <a:t>(slow-reveal diagram + ask the audience)</a:t>
+            </a:r>
           </a:p>
         </p:txBody>
       </p:sp>
     </p:spTree>
     <p:extLst>
       <p:ext uri="{BB962C8B-B14F-4D97-AF65-F5344CB8AC3E}">
-        <p14:creationId xmlns:p14="http://schemas.microsoft.com/office/powerpoint/2010/main" val="2288945912"/>
+        <p14:creationId xmlns:p14="http://schemas.microsoft.com/office/powerpoint/2010/main" val="1156631515"/>
       </p:ext>
     </p:extLst>
   </p:cSld>
@@ -1481,7 +2075,11 @@
           <a:p>
             <a:r>
               <a:rPr lang="en-US" dirty="0" smtClean="0"/>
-              <a:t>Options and Alternatives</a:t>
+              <a:t>Intro: Options </a:t>
+            </a:r>
+            <a:r>
+              <a:rPr lang="en-US" dirty="0" smtClean="0"/>
+              <a:t>and Alternatives</a:t>
             </a:r>
             <a:endParaRPr lang="en-US" dirty="0"/>
           </a:p>
@@ -1526,8 +2124,25 @@
           <a:p>
             <a:r>
               <a:rPr lang="en-US" dirty="0" smtClean="0"/>
-              <a:t>Code-First with manual migrations</a:t>
-            </a:r>
+              <a:t>Code-First with manual </a:t>
+            </a:r>
+            <a:r>
+              <a:rPr lang="en-US" dirty="0" smtClean="0"/>
+              <a:t>migrations</a:t>
+            </a:r>
+          </a:p>
+          <a:p>
+            <a:endParaRPr lang="en-US" dirty="0"/>
+          </a:p>
+          <a:p>
+            <a:pPr marL="0" indent="0">
+              <a:buNone/>
+            </a:pPr>
+            <a:r>
+              <a:rPr lang="en-US" dirty="0" smtClean="0"/>
+              <a:t>(diagrams + explanation)</a:t>
+            </a:r>
+            <a:endParaRPr lang="en-US" dirty="0" smtClean="0"/>
           </a:p>
         </p:txBody>
       </p:sp>
@@ -1578,7 +2193,7 @@
           <a:p>
             <a:r>
               <a:rPr lang="en-US" dirty="0" smtClean="0"/>
-              <a:t>Conclusion</a:t>
+              <a:t>Agenda</a:t>
             </a:r>
             <a:endParaRPr lang="en-US" dirty="0"/>
           </a:p>
@@ -1599,6 +2214,90 @@
           <a:bodyPr/>
           <a:lstStyle/>
           <a:p>
+            <a:pPr marL="0" indent="0">
+              <a:buNone/>
+            </a:pPr>
+            <a:r>
+              <a:rPr lang="en-US" dirty="0" smtClean="0"/>
+              <a:t>(window-pane grid here with 6 nuggets)</a:t>
+            </a:r>
+          </a:p>
+          <a:p>
+            <a:pPr marL="914400" lvl="1" indent="-457200">
+              <a:buFont typeface="+mj-lt"/>
+              <a:buAutoNum type="arabicPeriod"/>
+            </a:pPr>
+            <a:r>
+              <a:rPr lang="en-US" dirty="0" smtClean="0"/>
+              <a:t>Add models and mapping in code</a:t>
+            </a:r>
+          </a:p>
+          <a:p>
+            <a:pPr marL="914400" lvl="1" indent="-457200">
+              <a:buFont typeface="+mj-lt"/>
+              <a:buAutoNum type="arabicPeriod"/>
+            </a:pPr>
+            <a:r>
+              <a:rPr lang="en-US" dirty="0" smtClean="0"/>
+              <a:t>Connection String</a:t>
+            </a:r>
+          </a:p>
+          <a:p>
+            <a:pPr marL="914400" lvl="1" indent="-457200">
+              <a:buFont typeface="+mj-lt"/>
+              <a:buAutoNum type="arabicPeriod"/>
+            </a:pPr>
+            <a:r>
+              <a:rPr lang="en-US" dirty="0" smtClean="0"/>
+              <a:t>Enable Migrations</a:t>
+            </a:r>
+          </a:p>
+          <a:p>
+            <a:pPr marL="914400" lvl="1" indent="-457200">
+              <a:buFont typeface="+mj-lt"/>
+              <a:buAutoNum type="arabicPeriod"/>
+            </a:pPr>
+            <a:r>
+              <a:rPr lang="en-US" dirty="0" smtClean="0"/>
+              <a:t>Update Database</a:t>
+            </a:r>
+          </a:p>
+          <a:p>
+            <a:pPr marL="914400" lvl="1" indent="-457200">
+              <a:buFont typeface="+mj-lt"/>
+              <a:buAutoNum type="arabicPeriod"/>
+            </a:pPr>
+            <a:r>
+              <a:rPr lang="en-US" dirty="0" smtClean="0"/>
+              <a:t>Push code + Migrate server DB</a:t>
+            </a:r>
+          </a:p>
+          <a:p>
+            <a:pPr marL="914400" lvl="1" indent="-457200">
+              <a:buFont typeface="+mj-lt"/>
+              <a:buAutoNum type="arabicPeriod"/>
+            </a:pPr>
+            <a:r>
+              <a:rPr lang="en-US" dirty="0" smtClean="0"/>
+              <a:t>Process Workflow</a:t>
+            </a:r>
+          </a:p>
+          <a:p>
+            <a:pPr marL="914400" lvl="1" indent="-457200">
+              <a:buFont typeface="+mj-lt"/>
+              <a:buAutoNum type="arabicPeriod"/>
+            </a:pPr>
+            <a:endParaRPr lang="en-US" dirty="0" smtClean="0"/>
+          </a:p>
+          <a:p>
+            <a:pPr marL="914400" lvl="1" indent="-457200">
+              <a:buFont typeface="+mj-lt"/>
+              <a:buAutoNum type="arabicPeriod"/>
+            </a:pPr>
+            <a:endParaRPr lang="en-US" dirty="0" smtClean="0"/>
+          </a:p>
+          <a:p>
+            <a:pPr lvl="1"/>
             <a:endParaRPr lang="en-US" dirty="0"/>
           </a:p>
         </p:txBody>
@@ -1606,7 +2305,7 @@
     </p:spTree>
     <p:extLst>
       <p:ext uri="{BB962C8B-B14F-4D97-AF65-F5344CB8AC3E}">
-        <p14:creationId xmlns:p14="http://schemas.microsoft.com/office/powerpoint/2010/main" val="1450648149"/>
+        <p14:creationId xmlns:p14="http://schemas.microsoft.com/office/powerpoint/2010/main" val="1467393609"/>
       </p:ext>
     </p:extLst>
   </p:cSld>
@@ -1633,10 +2332,461 @@
           <a:chExt cx="0" cy="0"/>
         </a:xfrm>
       </p:grpSpPr>
+      <p:sp>
+        <p:nvSpPr>
+          <p:cNvPr id="2" name="Title 1"/>
+          <p:cNvSpPr>
+            <a:spLocks noGrp="1"/>
+          </p:cNvSpPr>
+          <p:nvPr>
+            <p:ph type="title"/>
+          </p:nvPr>
+        </p:nvSpPr>
+        <p:spPr/>
+        <p:txBody>
+          <a:bodyPr/>
+          <a:lstStyle/>
+          <a:p>
+            <a:r>
+              <a:rPr lang="en-US" dirty="0" smtClean="0"/>
+              <a:t>1 of 6: </a:t>
+            </a:r>
+            <a:endParaRPr lang="en-US" dirty="0"/>
+          </a:p>
+        </p:txBody>
+      </p:sp>
+      <p:sp>
+        <p:nvSpPr>
+          <p:cNvPr id="3" name="Content Placeholder 2"/>
+          <p:cNvSpPr>
+            <a:spLocks noGrp="1"/>
+          </p:cNvSpPr>
+          <p:nvPr>
+            <p:ph idx="1"/>
+          </p:nvPr>
+        </p:nvSpPr>
+        <p:spPr/>
+        <p:txBody>
+          <a:bodyPr/>
+          <a:lstStyle/>
+          <a:p>
+            <a:r>
+              <a:rPr lang="en-US" dirty="0" smtClean="0"/>
+              <a:t>Models and Mapping in Code</a:t>
+            </a:r>
+          </a:p>
+          <a:p>
+            <a:r>
+              <a:rPr lang="en-US" dirty="0" smtClean="0"/>
+              <a:t>Object-Model Relationships</a:t>
+            </a:r>
+            <a:endParaRPr lang="en-US" dirty="0"/>
+          </a:p>
+        </p:txBody>
+      </p:sp>
     </p:spTree>
     <p:extLst>
       <p:ext uri="{BB962C8B-B14F-4D97-AF65-F5344CB8AC3E}">
-        <p14:creationId xmlns:p14="http://schemas.microsoft.com/office/powerpoint/2010/main" val="2404542755"/>
+        <p14:creationId xmlns:p14="http://schemas.microsoft.com/office/powerpoint/2010/main" val="3185315970"/>
+      </p:ext>
+    </p:extLst>
+  </p:cSld>
+  <p:clrMapOvr>
+    <a:masterClrMapping/>
+  </p:clrMapOvr>
+</p:sld>
+</file>
+
+<file path=ppt/slides/slide6.xml><?xml version="1.0" encoding="utf-8"?>
+<p:sld xmlns:a="http://schemas.openxmlformats.org/drawingml/2006/main" xmlns:r="http://schemas.openxmlformats.org/officeDocument/2006/relationships" xmlns:p="http://schemas.openxmlformats.org/presentationml/2006/main">
+  <p:cSld>
+    <p:spTree>
+      <p:nvGrpSpPr>
+        <p:cNvPr id="1" name=""/>
+        <p:cNvGrpSpPr/>
+        <p:nvPr/>
+      </p:nvGrpSpPr>
+      <p:grpSpPr>
+        <a:xfrm>
+          <a:off x="0" y="0"/>
+          <a:ext cx="0" cy="0"/>
+          <a:chOff x="0" y="0"/>
+          <a:chExt cx="0" cy="0"/>
+        </a:xfrm>
+      </p:grpSpPr>
+      <p:sp>
+        <p:nvSpPr>
+          <p:cNvPr id="2" name="Title 1"/>
+          <p:cNvSpPr>
+            <a:spLocks noGrp="1"/>
+          </p:cNvSpPr>
+          <p:nvPr>
+            <p:ph type="title"/>
+          </p:nvPr>
+        </p:nvSpPr>
+        <p:spPr/>
+        <p:txBody>
+          <a:bodyPr/>
+          <a:lstStyle/>
+          <a:p>
+            <a:r>
+              <a:rPr lang="en-US" dirty="0"/>
+              <a:t>2</a:t>
+            </a:r>
+            <a:r>
+              <a:rPr lang="en-US" dirty="0" smtClean="0"/>
+              <a:t> of 6: </a:t>
+            </a:r>
+            <a:endParaRPr lang="en-US" dirty="0"/>
+          </a:p>
+        </p:txBody>
+      </p:sp>
+      <p:sp>
+        <p:nvSpPr>
+          <p:cNvPr id="3" name="Content Placeholder 2"/>
+          <p:cNvSpPr>
+            <a:spLocks noGrp="1"/>
+          </p:cNvSpPr>
+          <p:nvPr>
+            <p:ph idx="1"/>
+          </p:nvPr>
+        </p:nvSpPr>
+        <p:spPr/>
+        <p:txBody>
+          <a:bodyPr/>
+          <a:lstStyle/>
+          <a:p>
+            <a:r>
+              <a:rPr lang="en-US" dirty="0" smtClean="0"/>
+              <a:t>Connection String</a:t>
+            </a:r>
+          </a:p>
+          <a:p>
+            <a:r>
+              <a:rPr lang="en-US" dirty="0" err="1" smtClean="0"/>
+              <a:t>Web.config</a:t>
+            </a:r>
+            <a:r>
+              <a:rPr lang="en-US" dirty="0" smtClean="0"/>
+              <a:t> </a:t>
+            </a:r>
+          </a:p>
+          <a:p>
+            <a:r>
+              <a:rPr lang="en-US" dirty="0" err="1" smtClean="0"/>
+              <a:t>configSource</a:t>
+            </a:r>
+            <a:endParaRPr lang="en-US" dirty="0" smtClean="0"/>
+          </a:p>
+          <a:p>
+            <a:r>
+              <a:rPr lang="en-US" dirty="0" smtClean="0"/>
+              <a:t>Machine </a:t>
+            </a:r>
+            <a:r>
+              <a:rPr lang="en-US" dirty="0" err="1" smtClean="0"/>
+              <a:t>config</a:t>
+            </a:r>
+            <a:endParaRPr lang="en-US" dirty="0"/>
+          </a:p>
+        </p:txBody>
+      </p:sp>
+    </p:spTree>
+    <p:extLst>
+      <p:ext uri="{BB962C8B-B14F-4D97-AF65-F5344CB8AC3E}">
+        <p14:creationId xmlns:p14="http://schemas.microsoft.com/office/powerpoint/2010/main" val="1470060015"/>
+      </p:ext>
+    </p:extLst>
+  </p:cSld>
+  <p:clrMapOvr>
+    <a:masterClrMapping/>
+  </p:clrMapOvr>
+</p:sld>
+</file>
+
+<file path=ppt/slides/slide7.xml><?xml version="1.0" encoding="utf-8"?>
+<p:sld xmlns:a="http://schemas.openxmlformats.org/drawingml/2006/main" xmlns:r="http://schemas.openxmlformats.org/officeDocument/2006/relationships" xmlns:p="http://schemas.openxmlformats.org/presentationml/2006/main">
+  <p:cSld>
+    <p:spTree>
+      <p:nvGrpSpPr>
+        <p:cNvPr id="1" name=""/>
+        <p:cNvGrpSpPr/>
+        <p:nvPr/>
+      </p:nvGrpSpPr>
+      <p:grpSpPr>
+        <a:xfrm>
+          <a:off x="0" y="0"/>
+          <a:ext cx="0" cy="0"/>
+          <a:chOff x="0" y="0"/>
+          <a:chExt cx="0" cy="0"/>
+        </a:xfrm>
+      </p:grpSpPr>
+      <p:sp>
+        <p:nvSpPr>
+          <p:cNvPr id="2" name="Title 1"/>
+          <p:cNvSpPr>
+            <a:spLocks noGrp="1"/>
+          </p:cNvSpPr>
+          <p:nvPr>
+            <p:ph type="title"/>
+          </p:nvPr>
+        </p:nvSpPr>
+        <p:spPr/>
+        <p:txBody>
+          <a:bodyPr/>
+          <a:lstStyle/>
+          <a:p>
+            <a:r>
+              <a:rPr lang="en-US" dirty="0"/>
+              <a:t>3</a:t>
+            </a:r>
+            <a:r>
+              <a:rPr lang="en-US" dirty="0" smtClean="0"/>
+              <a:t> of 6: </a:t>
+            </a:r>
+            <a:endParaRPr lang="en-US" dirty="0"/>
+          </a:p>
+        </p:txBody>
+      </p:sp>
+      <p:sp>
+        <p:nvSpPr>
+          <p:cNvPr id="3" name="Content Placeholder 2"/>
+          <p:cNvSpPr>
+            <a:spLocks noGrp="1"/>
+          </p:cNvSpPr>
+          <p:nvPr>
+            <p:ph idx="1"/>
+          </p:nvPr>
+        </p:nvSpPr>
+        <p:spPr/>
+        <p:txBody>
+          <a:bodyPr/>
+          <a:lstStyle/>
+          <a:p>
+            <a:r>
+              <a:rPr lang="en-US" dirty="0" smtClean="0"/>
+              <a:t>Enable Migrations</a:t>
+            </a:r>
+          </a:p>
+          <a:p>
+            <a:r>
+              <a:rPr lang="en-US" dirty="0" err="1" smtClean="0"/>
+              <a:t>Configuration.cs</a:t>
+            </a:r>
+            <a:endParaRPr lang="en-US" dirty="0" smtClean="0"/>
+          </a:p>
+          <a:p>
+            <a:r>
+              <a:rPr lang="en-US" dirty="0" smtClean="0"/>
+              <a:t>Add Seed data</a:t>
+            </a:r>
+            <a:endParaRPr lang="en-US" dirty="0"/>
+          </a:p>
+        </p:txBody>
+      </p:sp>
+    </p:spTree>
+    <p:extLst>
+      <p:ext uri="{BB962C8B-B14F-4D97-AF65-F5344CB8AC3E}">
+        <p14:creationId xmlns:p14="http://schemas.microsoft.com/office/powerpoint/2010/main" val="1950871537"/>
+      </p:ext>
+    </p:extLst>
+  </p:cSld>
+  <p:clrMapOvr>
+    <a:masterClrMapping/>
+  </p:clrMapOvr>
+</p:sld>
+</file>
+
+<file path=ppt/slides/slide8.xml><?xml version="1.0" encoding="utf-8"?>
+<p:sld xmlns:a="http://schemas.openxmlformats.org/drawingml/2006/main" xmlns:r="http://schemas.openxmlformats.org/officeDocument/2006/relationships" xmlns:p="http://schemas.openxmlformats.org/presentationml/2006/main">
+  <p:cSld>
+    <p:spTree>
+      <p:nvGrpSpPr>
+        <p:cNvPr id="1" name=""/>
+        <p:cNvGrpSpPr/>
+        <p:nvPr/>
+      </p:nvGrpSpPr>
+      <p:grpSpPr>
+        <a:xfrm>
+          <a:off x="0" y="0"/>
+          <a:ext cx="0" cy="0"/>
+          <a:chOff x="0" y="0"/>
+          <a:chExt cx="0" cy="0"/>
+        </a:xfrm>
+      </p:grpSpPr>
+      <p:sp>
+        <p:nvSpPr>
+          <p:cNvPr id="2" name="Title 1"/>
+          <p:cNvSpPr>
+            <a:spLocks noGrp="1"/>
+          </p:cNvSpPr>
+          <p:nvPr>
+            <p:ph type="title"/>
+          </p:nvPr>
+        </p:nvSpPr>
+        <p:spPr/>
+        <p:txBody>
+          <a:bodyPr/>
+          <a:lstStyle/>
+          <a:p>
+            <a:r>
+              <a:rPr lang="en-US" dirty="0"/>
+              <a:t>4</a:t>
+            </a:r>
+            <a:r>
+              <a:rPr lang="en-US" dirty="0" smtClean="0"/>
+              <a:t> of 6: </a:t>
+            </a:r>
+            <a:endParaRPr lang="en-US" dirty="0"/>
+          </a:p>
+        </p:txBody>
+      </p:sp>
+      <p:sp>
+        <p:nvSpPr>
+          <p:cNvPr id="3" name="Content Placeholder 2"/>
+          <p:cNvSpPr>
+            <a:spLocks noGrp="1"/>
+          </p:cNvSpPr>
+          <p:nvPr>
+            <p:ph idx="1"/>
+          </p:nvPr>
+        </p:nvSpPr>
+        <p:spPr/>
+        <p:txBody>
+          <a:bodyPr/>
+          <a:lstStyle/>
+          <a:p>
+            <a:r>
+              <a:rPr lang="en-US" dirty="0" smtClean="0"/>
+              <a:t>Update Database</a:t>
+            </a:r>
+          </a:p>
+          <a:p>
+            <a:r>
+              <a:rPr lang="en-US" dirty="0" smtClean="0"/>
+              <a:t>Run Seed Data</a:t>
+            </a:r>
+          </a:p>
+          <a:p>
+            <a:r>
+              <a:rPr lang="en-US" dirty="0" smtClean="0"/>
+              <a:t>Verify SQL</a:t>
+            </a:r>
+          </a:p>
+          <a:p>
+            <a:r>
+              <a:rPr lang="en-US" dirty="0" smtClean="0"/>
+              <a:t>Verify DB</a:t>
+            </a:r>
+            <a:endParaRPr lang="en-US" dirty="0"/>
+          </a:p>
+        </p:txBody>
+      </p:sp>
+    </p:spTree>
+    <p:extLst>
+      <p:ext uri="{BB962C8B-B14F-4D97-AF65-F5344CB8AC3E}">
+        <p14:creationId xmlns:p14="http://schemas.microsoft.com/office/powerpoint/2010/main" val="2059606158"/>
+      </p:ext>
+    </p:extLst>
+  </p:cSld>
+  <p:clrMapOvr>
+    <a:masterClrMapping/>
+  </p:clrMapOvr>
+</p:sld>
+</file>
+
+<file path=ppt/slides/slide9.xml><?xml version="1.0" encoding="utf-8"?>
+<p:sld xmlns:a="http://schemas.openxmlformats.org/drawingml/2006/main" xmlns:r="http://schemas.openxmlformats.org/officeDocument/2006/relationships" xmlns:p="http://schemas.openxmlformats.org/presentationml/2006/main">
+  <p:cSld>
+    <p:spTree>
+      <p:nvGrpSpPr>
+        <p:cNvPr id="1" name=""/>
+        <p:cNvGrpSpPr/>
+        <p:nvPr/>
+      </p:nvGrpSpPr>
+      <p:grpSpPr>
+        <a:xfrm>
+          <a:off x="0" y="0"/>
+          <a:ext cx="0" cy="0"/>
+          <a:chOff x="0" y="0"/>
+          <a:chExt cx="0" cy="0"/>
+        </a:xfrm>
+      </p:grpSpPr>
+      <p:sp>
+        <p:nvSpPr>
+          <p:cNvPr id="2" name="Title 1"/>
+          <p:cNvSpPr>
+            <a:spLocks noGrp="1"/>
+          </p:cNvSpPr>
+          <p:nvPr>
+            <p:ph type="title"/>
+          </p:nvPr>
+        </p:nvSpPr>
+        <p:spPr/>
+        <p:txBody>
+          <a:bodyPr/>
+          <a:lstStyle/>
+          <a:p>
+            <a:r>
+              <a:rPr lang="en-US" dirty="0" smtClean="0"/>
+              <a:t>5 of 6: </a:t>
+            </a:r>
+            <a:endParaRPr lang="en-US" dirty="0"/>
+          </a:p>
+        </p:txBody>
+      </p:sp>
+      <p:sp>
+        <p:nvSpPr>
+          <p:cNvPr id="3" name="Content Placeholder 2"/>
+          <p:cNvSpPr>
+            <a:spLocks noGrp="1"/>
+          </p:cNvSpPr>
+          <p:nvPr>
+            <p:ph idx="1"/>
+          </p:nvPr>
+        </p:nvSpPr>
+        <p:spPr/>
+        <p:txBody>
+          <a:bodyPr/>
+          <a:lstStyle/>
+          <a:p>
+            <a:r>
+              <a:rPr lang="en-US" dirty="0" smtClean="0"/>
+              <a:t>Push code to source control</a:t>
+            </a:r>
+          </a:p>
+          <a:p>
+            <a:r>
+              <a:rPr lang="en-US" dirty="0" smtClean="0"/>
+              <a:t>Other developers pull and Update Database</a:t>
+            </a:r>
+          </a:p>
+          <a:p>
+            <a:r>
+              <a:rPr lang="en-US" dirty="0" smtClean="0"/>
+              <a:t>Migrate server DB via migrate.exe</a:t>
+            </a:r>
+          </a:p>
+          <a:p>
+            <a:r>
+              <a:rPr lang="en-US" dirty="0" smtClean="0"/>
+              <a:t>Use </a:t>
+            </a:r>
+            <a:r>
+              <a:rPr lang="en-US" dirty="0" err="1" smtClean="0"/>
+              <a:t>TeamCity</a:t>
+            </a:r>
+            <a:r>
+              <a:rPr lang="en-US" dirty="0" smtClean="0"/>
+              <a:t> to automate this</a:t>
+            </a:r>
+          </a:p>
+        </p:txBody>
+      </p:sp>
+    </p:spTree>
+    <p:extLst>
+      <p:ext uri="{BB962C8B-B14F-4D97-AF65-F5344CB8AC3E}">
+        <p14:creationId xmlns:p14="http://schemas.microsoft.com/office/powerpoint/2010/main" val="4246540840"/>
       </p:ext>
     </p:extLst>
   </p:cSld>
@@ -2550,7 +3700,7 @@
   </a:extraClrSchemeLst>
   <a:extLst>
     <a:ext uri="{05A4C25C-085E-4340-85A3-A5531E510DB2}">
-      <thm15:themeFamily xmlns:thm15="http://schemas.microsoft.com/office/thememl/2012/main" xmlns="" name="Excella" id="{9A5F6432-036B-4B94-AD11-BE20D0494622}" vid="{7466CE9E-D5DB-4024-BB33-EA4F022184C8}"/>
+      <thm15:themeFamily xmlns="" xmlns:thm15="http://schemas.microsoft.com/office/thememl/2012/main" name="Excella" id="{9A5F6432-036B-4B94-AD11-BE20D0494622}" vid="{7466CE9E-D5DB-4024-BB33-EA4F022184C8}"/>
     </a:ext>
   </a:extLst>
 </a:theme>

</xml_diff>

<commit_message>
updated presentation to include intro, etc and placeholders for others
</commit_message>
<xml_diff>
--- a/_presentations/CodeFirstMigrations.pptx
+++ b/_presentations/CodeFirstMigrations.pptx
@@ -6,20 +6,28 @@
   </p:sldMasterIdLst>
   <p:sldIdLst>
     <p:sldId id="256" r:id="rId2"/>
-    <p:sldId id="261" r:id="rId3"/>
-    <p:sldId id="259" r:id="rId4"/>
-    <p:sldId id="262" r:id="rId5"/>
-    <p:sldId id="263" r:id="rId6"/>
-    <p:sldId id="264" r:id="rId7"/>
-    <p:sldId id="265" r:id="rId8"/>
-    <p:sldId id="266" r:id="rId9"/>
-    <p:sldId id="267" r:id="rId10"/>
-    <p:sldId id="268" r:id="rId11"/>
-    <p:sldId id="269" r:id="rId12"/>
-    <p:sldId id="270" r:id="rId13"/>
-    <p:sldId id="260" r:id="rId14"/>
-    <p:sldId id="258" r:id="rId15"/>
-    <p:sldId id="257" r:id="rId16"/>
+    <p:sldId id="278" r:id="rId3"/>
+    <p:sldId id="272" r:id="rId4"/>
+    <p:sldId id="273" r:id="rId5"/>
+    <p:sldId id="261" r:id="rId6"/>
+    <p:sldId id="259" r:id="rId7"/>
+    <p:sldId id="262" r:id="rId8"/>
+    <p:sldId id="263" r:id="rId9"/>
+    <p:sldId id="264" r:id="rId10"/>
+    <p:sldId id="265" r:id="rId11"/>
+    <p:sldId id="266" r:id="rId12"/>
+    <p:sldId id="267" r:id="rId13"/>
+    <p:sldId id="268" r:id="rId14"/>
+    <p:sldId id="269" r:id="rId15"/>
+    <p:sldId id="270" r:id="rId16"/>
+    <p:sldId id="260" r:id="rId17"/>
+    <p:sldId id="274" r:id="rId18"/>
+    <p:sldId id="275" r:id="rId19"/>
+    <p:sldId id="276" r:id="rId20"/>
+    <p:sldId id="277" r:id="rId21"/>
+    <p:sldId id="258" r:id="rId22"/>
+    <p:sldId id="271" r:id="rId23"/>
+    <p:sldId id="257" r:id="rId24"/>
   </p:sldIdLst>
   <p:sldSz cx="9144000" cy="6858000" type="screen4x3"/>
   <p:notesSz cx="6858000" cy="9144000"/>
@@ -150,7 +158,7 @@
   </p:defaultTextStyle>
   <p:extLst>
     <p:ext uri="{EFAFB233-063F-42B5-8137-9DF3F51BA10A}">
-      <p15:sldGuideLst xmlns="" xmlns:p15="http://schemas.microsoft.com/office/powerpoint/2012/main">
+      <p15:sldGuideLst xmlns:p15="http://schemas.microsoft.com/office/powerpoint/2012/main" xmlns="">
         <p15:guide id="1" orient="horz" pos="2160">
           <p15:clr>
             <a:srgbClr val="A4A3A4"/>
@@ -164,7 +172,7 @@
       </p15:sldGuideLst>
     </p:ext>
     <p:ext uri="{2D200454-40CA-4A62-9FC3-DE9A4176ACB9}">
-      <p15:notesGuideLst xmlns="" xmlns:p15="http://schemas.microsoft.com/office/powerpoint/2012/main">
+      <p15:notesGuideLst xmlns:p15="http://schemas.microsoft.com/office/powerpoint/2012/main" xmlns="">
         <p15:guide id="1" orient="horz" pos="2880">
           <p15:clr>
             <a:srgbClr val="A4A3A4"/>
@@ -615,6 +623,156 @@
 </p:sldLayout>
 </file>
 
+<file path=ppt/slideLayouts/slideLayout4.xml><?xml version="1.0" encoding="utf-8"?>
+<p:sldLayout xmlns:a="http://schemas.openxmlformats.org/drawingml/2006/main" xmlns:r="http://schemas.openxmlformats.org/officeDocument/2006/relationships" xmlns:p="http://schemas.openxmlformats.org/presentationml/2006/main" type="titleOnly">
+  <p:cSld name="Title Only">
+    <p:spTree>
+      <p:nvGrpSpPr>
+        <p:cNvPr id="1" name=""/>
+        <p:cNvGrpSpPr/>
+        <p:nvPr/>
+      </p:nvGrpSpPr>
+      <p:grpSpPr>
+        <a:xfrm>
+          <a:off x="0" y="0"/>
+          <a:ext cx="0" cy="0"/>
+          <a:chOff x="0" y="0"/>
+          <a:chExt cx="0" cy="0"/>
+        </a:xfrm>
+      </p:grpSpPr>
+      <p:sp>
+        <p:nvSpPr>
+          <p:cNvPr id="2" name="Title 1"/>
+          <p:cNvSpPr>
+            <a:spLocks noGrp="1"/>
+          </p:cNvSpPr>
+          <p:nvPr>
+            <p:ph type="title"/>
+          </p:nvPr>
+        </p:nvSpPr>
+        <p:spPr>
+          <a:xfrm>
+            <a:off x="628650" y="365128"/>
+            <a:ext cx="7886700" cy="1325563"/>
+          </a:xfrm>
+          <a:prstGeom prst="rect">
+            <a:avLst/>
+          </a:prstGeom>
+        </p:spPr>
+        <p:txBody>
+          <a:bodyPr/>
+          <a:lstStyle/>
+          <a:p>
+            <a:r>
+              <a:rPr lang="en-US" smtClean="0"/>
+              <a:t>Click to edit Master title style</a:t>
+            </a:r>
+            <a:endParaRPr lang="en-US"/>
+          </a:p>
+        </p:txBody>
+      </p:sp>
+      <p:sp>
+        <p:nvSpPr>
+          <p:cNvPr id="3" name="Date Placeholder 2"/>
+          <p:cNvSpPr>
+            <a:spLocks noGrp="1"/>
+          </p:cNvSpPr>
+          <p:nvPr>
+            <p:ph type="dt" sz="half" idx="10"/>
+          </p:nvPr>
+        </p:nvSpPr>
+        <p:spPr>
+          <a:xfrm>
+            <a:off x="628650" y="6356353"/>
+            <a:ext cx="2057400" cy="365125"/>
+          </a:xfrm>
+          <a:prstGeom prst="rect">
+            <a:avLst/>
+          </a:prstGeom>
+        </p:spPr>
+        <p:txBody>
+          <a:bodyPr/>
+          <a:lstStyle/>
+          <a:p>
+            <a:fld id="{2A8952F3-850D-43B5-8EAB-46809C6C734A}" type="datetimeFigureOut">
+              <a:rPr lang="en-US" smtClean="0"/>
+              <a:t>4/18/2013</a:t>
+            </a:fld>
+            <a:endParaRPr lang="en-US"/>
+          </a:p>
+        </p:txBody>
+      </p:sp>
+      <p:sp>
+        <p:nvSpPr>
+          <p:cNvPr id="4" name="Footer Placeholder 3"/>
+          <p:cNvSpPr>
+            <a:spLocks noGrp="1"/>
+          </p:cNvSpPr>
+          <p:nvPr>
+            <p:ph type="ftr" sz="quarter" idx="11"/>
+          </p:nvPr>
+        </p:nvSpPr>
+        <p:spPr>
+          <a:xfrm>
+            <a:off x="3028950" y="6356353"/>
+            <a:ext cx="3086100" cy="365125"/>
+          </a:xfrm>
+          <a:prstGeom prst="rect">
+            <a:avLst/>
+          </a:prstGeom>
+        </p:spPr>
+        <p:txBody>
+          <a:bodyPr/>
+          <a:lstStyle/>
+          <a:p>
+            <a:endParaRPr lang="en-US"/>
+          </a:p>
+        </p:txBody>
+      </p:sp>
+      <p:sp>
+        <p:nvSpPr>
+          <p:cNvPr id="5" name="Slide Number Placeholder 4"/>
+          <p:cNvSpPr>
+            <a:spLocks noGrp="1"/>
+          </p:cNvSpPr>
+          <p:nvPr>
+            <p:ph type="sldNum" sz="quarter" idx="12"/>
+          </p:nvPr>
+        </p:nvSpPr>
+        <p:spPr>
+          <a:xfrm>
+            <a:off x="6457950" y="6356353"/>
+            <a:ext cx="2057400" cy="365125"/>
+          </a:xfrm>
+          <a:prstGeom prst="rect">
+            <a:avLst/>
+          </a:prstGeom>
+        </p:spPr>
+        <p:txBody>
+          <a:bodyPr/>
+          <a:lstStyle/>
+          <a:p>
+            <a:fld id="{D63F4B2E-20AB-493A-A23F-E6E6045D7996}" type="slidenum">
+              <a:rPr lang="en-US" smtClean="0"/>
+              <a:t>‹#›</a:t>
+            </a:fld>
+            <a:endParaRPr lang="en-US"/>
+          </a:p>
+        </p:txBody>
+      </p:sp>
+    </p:spTree>
+    <p:extLst>
+      <p:ext uri="{BB962C8B-B14F-4D97-AF65-F5344CB8AC3E}">
+        <p14:creationId xmlns:p14="http://schemas.microsoft.com/office/powerpoint/2010/main" val="1826013316"/>
+      </p:ext>
+    </p:extLst>
+  </p:cSld>
+  <p:clrMapOvr>
+    <a:masterClrMapping/>
+  </p:clrMapOvr>
+</p:sldLayout>
+</file>
+
 <file path=ppt/slideMasters/slideMaster1.xml><?xml version="1.0" encoding="utf-8"?>
 <p:sldMaster xmlns:a="http://schemas.openxmlformats.org/drawingml/2006/main" xmlns:r="http://schemas.openxmlformats.org/officeDocument/2006/relationships" xmlns:p="http://schemas.openxmlformats.org/presentationml/2006/main">
   <p:cSld>
@@ -702,7 +860,7 @@
           <p:nvPr/>
         </p:nvPicPr>
         <p:blipFill>
-          <a:blip r:embed="rId5">
+          <a:blip r:embed="rId6">
             <a:extLst>
               <a:ext uri="{28A0092B-C50C-407E-A947-70E740481C1C}">
                 <a14:useLocalDpi xmlns:a14="http://schemas.microsoft.com/office/drawing/2010/main" val="0"/>
@@ -754,6 +912,7 @@
     <p:sldLayoutId id="2147484114" r:id="rId1"/>
     <p:sldLayoutId id="2147484115" r:id="rId2"/>
     <p:sldLayoutId id="2147484113" r:id="rId3"/>
+    <p:sldLayoutId id="2147484116" r:id="rId4"/>
   </p:sldLayoutIdLst>
   <p:timing>
     <p:tnLst>
@@ -1182,8 +1341,8 @@
         </p:nvSpPr>
         <p:spPr>
           <a:xfrm>
-            <a:off x="615462" y="2590800"/>
-            <a:ext cx="8001000" cy="1143000"/>
+            <a:off x="76200" y="1905000"/>
+            <a:ext cx="8991600" cy="914400"/>
           </a:xfrm>
           <a:prstGeom prst="rect">
             <a:avLst/>
@@ -1335,10 +1494,10 @@
           </a:lstStyle>
           <a:p>
             <a:r>
-              <a:rPr lang="en-US" dirty="0" smtClean="0"/>
-              <a:t>Code First Migrations</a:t>
-            </a:r>
-            <a:endParaRPr lang="en-US" dirty="0"/>
+              <a:rPr lang="en-US" sz="5400" b="1" dirty="0" smtClean="0"/>
+              <a:t>Lean Enterprise Architecture </a:t>
+            </a:r>
+            <a:endParaRPr lang="en-US" sz="5400" b="1" dirty="0"/>
           </a:p>
         </p:txBody>
       </p:sp>
@@ -1350,25 +1509,215 @@
         </p:nvSpPr>
         <p:spPr>
           <a:xfrm>
-            <a:off x="2990356" y="3733800"/>
-            <a:ext cx="3251211" cy="461665"/>
+            <a:off x="304800" y="4343400"/>
+            <a:ext cx="8686800" cy="461665"/>
           </a:xfrm>
           <a:prstGeom prst="rect">
             <a:avLst/>
           </a:prstGeom>
-          <a:noFill/>
+          <a:solidFill>
+            <a:schemeClr val="bg1">
+              <a:lumMod val="95000"/>
+            </a:schemeClr>
+          </a:solidFill>
         </p:spPr>
         <p:txBody>
-          <a:bodyPr wrap="none" rtlCol="0">
+          <a:bodyPr wrap="square" rtlCol="0">
             <a:spAutoFit/>
           </a:bodyPr>
           <a:lstStyle/>
           <a:p>
-            <a:r>
-              <a:rPr lang="en-US" dirty="0" smtClean="0"/>
-              <a:t>By Shahed Chowdhuri</a:t>
+            <a:pPr algn="ctr"/>
+            <a:r>
+              <a:rPr lang="en-US" dirty="0" smtClean="0"/>
+              <a:t>By Shahed </a:t>
+            </a:r>
+            <a:r>
+              <a:rPr lang="en-US" dirty="0" smtClean="0"/>
+              <a:t>Chowdhuri</a:t>
+            </a:r>
+            <a:r>
+              <a:rPr lang="en-US" dirty="0"/>
+              <a:t>, Sahil </a:t>
+            </a:r>
+            <a:r>
+              <a:rPr lang="en-US" dirty="0" smtClean="0"/>
+              <a:t>Talwar, Doguhan </a:t>
+            </a:r>
+            <a:r>
+              <a:rPr lang="en-US" dirty="0" smtClean="0"/>
+              <a:t>Uluca</a:t>
             </a:r>
             <a:endParaRPr lang="en-US" dirty="0"/>
+          </a:p>
+        </p:txBody>
+      </p:sp>
+      <p:sp>
+        <p:nvSpPr>
+          <p:cNvPr id="4" name="Title 1"/>
+          <p:cNvSpPr txBox="1">
+            <a:spLocks/>
+          </p:cNvSpPr>
+          <p:nvPr/>
+        </p:nvSpPr>
+        <p:spPr>
+          <a:xfrm>
+            <a:off x="76200" y="2667000"/>
+            <a:ext cx="8991600" cy="914400"/>
+          </a:xfrm>
+          <a:prstGeom prst="rect">
+            <a:avLst/>
+          </a:prstGeom>
+        </p:spPr>
+        <p:txBody>
+          <a:bodyPr/>
+          <a:lstStyle>
+            <a:lvl1pPr algn="ctr" rtl="0" eaLnBrk="1" fontAlgn="base" hangingPunct="1">
+              <a:spcBef>
+                <a:spcPct val="0"/>
+              </a:spcBef>
+              <a:spcAft>
+                <a:spcPct val="0"/>
+              </a:spcAft>
+              <a:defRPr sz="4400">
+                <a:solidFill>
+                  <a:schemeClr val="tx2"/>
+                </a:solidFill>
+                <a:latin typeface="+mj-lt"/>
+                <a:ea typeface="ＭＳ Ｐゴシック" pitchFamily="34" charset="-128"/>
+                <a:cs typeface="ＭＳ Ｐゴシック"/>
+              </a:defRPr>
+            </a:lvl1pPr>
+            <a:lvl2pPr algn="ctr" rtl="0" eaLnBrk="1" fontAlgn="base" hangingPunct="1">
+              <a:spcBef>
+                <a:spcPct val="0"/>
+              </a:spcBef>
+              <a:spcAft>
+                <a:spcPct val="0"/>
+              </a:spcAft>
+              <a:defRPr sz="4400">
+                <a:solidFill>
+                  <a:schemeClr val="tx2"/>
+                </a:solidFill>
+                <a:latin typeface="Calibri" pitchFamily="34" charset="0"/>
+                <a:ea typeface="ＭＳ Ｐゴシック" pitchFamily="28" charset="-128"/>
+                <a:cs typeface="ＭＳ Ｐゴシック"/>
+              </a:defRPr>
+            </a:lvl2pPr>
+            <a:lvl3pPr algn="ctr" rtl="0" eaLnBrk="1" fontAlgn="base" hangingPunct="1">
+              <a:spcBef>
+                <a:spcPct val="0"/>
+              </a:spcBef>
+              <a:spcAft>
+                <a:spcPct val="0"/>
+              </a:spcAft>
+              <a:defRPr sz="4400">
+                <a:solidFill>
+                  <a:schemeClr val="tx2"/>
+                </a:solidFill>
+                <a:latin typeface="Calibri" pitchFamily="34" charset="0"/>
+                <a:ea typeface="ＭＳ Ｐゴシック" pitchFamily="28" charset="-128"/>
+                <a:cs typeface="ＭＳ Ｐゴシック"/>
+              </a:defRPr>
+            </a:lvl3pPr>
+            <a:lvl4pPr algn="ctr" rtl="0" eaLnBrk="1" fontAlgn="base" hangingPunct="1">
+              <a:spcBef>
+                <a:spcPct val="0"/>
+              </a:spcBef>
+              <a:spcAft>
+                <a:spcPct val="0"/>
+              </a:spcAft>
+              <a:defRPr sz="4400">
+                <a:solidFill>
+                  <a:schemeClr val="tx2"/>
+                </a:solidFill>
+                <a:latin typeface="Calibri" pitchFamily="34" charset="0"/>
+                <a:ea typeface="ＭＳ Ｐゴシック" pitchFamily="28" charset="-128"/>
+                <a:cs typeface="ＭＳ Ｐゴシック"/>
+              </a:defRPr>
+            </a:lvl4pPr>
+            <a:lvl5pPr algn="ctr" rtl="0" eaLnBrk="1" fontAlgn="base" hangingPunct="1">
+              <a:spcBef>
+                <a:spcPct val="0"/>
+              </a:spcBef>
+              <a:spcAft>
+                <a:spcPct val="0"/>
+              </a:spcAft>
+              <a:defRPr sz="4400">
+                <a:solidFill>
+                  <a:schemeClr val="tx2"/>
+                </a:solidFill>
+                <a:latin typeface="Calibri" pitchFamily="34" charset="0"/>
+                <a:ea typeface="ＭＳ Ｐゴシック" pitchFamily="28" charset="-128"/>
+                <a:cs typeface="ＭＳ Ｐゴシック"/>
+              </a:defRPr>
+            </a:lvl5pPr>
+            <a:lvl6pPr marL="457200" algn="ctr" rtl="0" eaLnBrk="1" fontAlgn="base" hangingPunct="1">
+              <a:spcBef>
+                <a:spcPct val="0"/>
+              </a:spcBef>
+              <a:spcAft>
+                <a:spcPct val="0"/>
+              </a:spcAft>
+              <a:defRPr sz="4400">
+                <a:solidFill>
+                  <a:schemeClr val="tx2"/>
+                </a:solidFill>
+                <a:latin typeface="Arial" pitchFamily="34" charset="0"/>
+                <a:ea typeface="ＭＳ Ｐゴシック" pitchFamily="28" charset="-128"/>
+              </a:defRPr>
+            </a:lvl6pPr>
+            <a:lvl7pPr marL="914400" algn="ctr" rtl="0" eaLnBrk="1" fontAlgn="base" hangingPunct="1">
+              <a:spcBef>
+                <a:spcPct val="0"/>
+              </a:spcBef>
+              <a:spcAft>
+                <a:spcPct val="0"/>
+              </a:spcAft>
+              <a:defRPr sz="4400">
+                <a:solidFill>
+                  <a:schemeClr val="tx2"/>
+                </a:solidFill>
+                <a:latin typeface="Arial" pitchFamily="34" charset="0"/>
+                <a:ea typeface="ＭＳ Ｐゴシック" pitchFamily="28" charset="-128"/>
+              </a:defRPr>
+            </a:lvl7pPr>
+            <a:lvl8pPr marL="1371600" algn="ctr" rtl="0" eaLnBrk="1" fontAlgn="base" hangingPunct="1">
+              <a:spcBef>
+                <a:spcPct val="0"/>
+              </a:spcBef>
+              <a:spcAft>
+                <a:spcPct val="0"/>
+              </a:spcAft>
+              <a:defRPr sz="4400">
+                <a:solidFill>
+                  <a:schemeClr val="tx2"/>
+                </a:solidFill>
+                <a:latin typeface="Arial" pitchFamily="34" charset="0"/>
+                <a:ea typeface="ＭＳ Ｐゴシック" pitchFamily="28" charset="-128"/>
+              </a:defRPr>
+            </a:lvl8pPr>
+            <a:lvl9pPr marL="1828800" algn="ctr" rtl="0" eaLnBrk="1" fontAlgn="base" hangingPunct="1">
+              <a:spcBef>
+                <a:spcPct val="0"/>
+              </a:spcBef>
+              <a:spcAft>
+                <a:spcPct val="0"/>
+              </a:spcAft>
+              <a:defRPr sz="4400">
+                <a:solidFill>
+                  <a:schemeClr val="tx2"/>
+                </a:solidFill>
+                <a:latin typeface="Arial" pitchFamily="34" charset="0"/>
+                <a:ea typeface="ＭＳ Ｐゴシック" pitchFamily="28" charset="-128"/>
+              </a:defRPr>
+            </a:lvl9pPr>
+          </a:lstStyle>
+          <a:p>
+            <a:r>
+              <a:rPr lang="en-US" sz="2400" dirty="0"/>
+              <a:t>A lean, testable enterprise architecture with a modern client stack</a:t>
+            </a:r>
           </a:p>
         </p:txBody>
       </p:sp>
@@ -1382,6 +1731,13 @@
   <p:clrMapOvr>
     <a:masterClrMapping/>
   </p:clrMapOvr>
+  <p:timing>
+    <p:tnLst>
+      <p:par>
+        <p:cTn id="1" dur="indefinite" restart="never" nodeType="tmRoot"/>
+      </p:par>
+    </p:tnLst>
+  </p:timing>
 </p:sld>
 </file>
 
@@ -1419,7 +1775,7 @@
           <a:p>
             <a:r>
               <a:rPr lang="en-US" dirty="0"/>
-              <a:t>6</a:t>
+              <a:t>3</a:t>
             </a:r>
             <a:r>
               <a:rPr lang="en-US" dirty="0" smtClean="0"/>
@@ -1446,19 +1802,20 @@
           <a:p>
             <a:r>
               <a:rPr lang="en-US" dirty="0" smtClean="0"/>
-              <a:t>Process Workflow</a:t>
-            </a:r>
-          </a:p>
-          <a:p>
-            <a:r>
-              <a:rPr lang="en-US" dirty="0" smtClean="0"/>
-              <a:t>Handle existing database</a:t>
-            </a:r>
-          </a:p>
-          <a:p>
-            <a:r>
-              <a:rPr lang="en-US" dirty="0" smtClean="0"/>
-              <a:t>Comply with enterprise requirements</a:t>
+              <a:t>Enable Migrations</a:t>
+            </a:r>
+          </a:p>
+          <a:p>
+            <a:r>
+              <a:rPr lang="en-US" dirty="0" err="1" smtClean="0"/>
+              <a:t>Configuration.cs</a:t>
+            </a:r>
+            <a:endParaRPr lang="en-US" dirty="0" smtClean="0"/>
+          </a:p>
+          <a:p>
+            <a:r>
+              <a:rPr lang="en-US" dirty="0" smtClean="0"/>
+              <a:t>Add Seed data</a:t>
             </a:r>
             <a:endParaRPr lang="en-US" dirty="0"/>
           </a:p>
@@ -1467,13 +1824,20 @@
     </p:spTree>
     <p:extLst>
       <p:ext uri="{BB962C8B-B14F-4D97-AF65-F5344CB8AC3E}">
-        <p14:creationId xmlns:p14="http://schemas.microsoft.com/office/powerpoint/2010/main" val="3114339337"/>
+        <p14:creationId xmlns:p14="http://schemas.microsoft.com/office/powerpoint/2010/main" val="1950871537"/>
       </p:ext>
     </p:extLst>
   </p:cSld>
   <p:clrMapOvr>
     <a:masterClrMapping/>
   </p:clrMapOvr>
+  <p:timing>
+    <p:tnLst>
+      <p:par>
+        <p:cTn id="1" dur="indefinite" restart="never" nodeType="tmRoot"/>
+      </p:par>
+    </p:tnLst>
+  </p:timing>
 </p:sld>
 </file>
 
@@ -1510,8 +1874,12 @@
           <a:lstStyle/>
           <a:p>
             <a:r>
-              <a:rPr lang="en-US" dirty="0" smtClean="0"/>
-              <a:t>Self-Correcting Worksheet</a:t>
+              <a:rPr lang="en-US" dirty="0"/>
+              <a:t>4</a:t>
+            </a:r>
+            <a:r>
+              <a:rPr lang="en-US" dirty="0" smtClean="0"/>
+              <a:t> of 6: </a:t>
             </a:r>
             <a:endParaRPr lang="en-US" dirty="0"/>
           </a:p>
@@ -1534,7 +1902,25 @@
           <a:p>
             <a:r>
               <a:rPr lang="en-US" dirty="0" smtClean="0"/>
-              <a:t>Fill in the blanks (if time permits)</a:t>
+              <a:t>Update Database</a:t>
+            </a:r>
+          </a:p>
+          <a:p>
+            <a:r>
+              <a:rPr lang="en-US" dirty="0" smtClean="0"/>
+              <a:t>Run Seed Data</a:t>
+            </a:r>
+          </a:p>
+          <a:p>
+            <a:r>
+              <a:rPr lang="en-US" dirty="0" smtClean="0"/>
+              <a:t>Verify SQL</a:t>
+            </a:r>
+          </a:p>
+          <a:p>
+            <a:r>
+              <a:rPr lang="en-US" dirty="0" smtClean="0"/>
+              <a:t>Verify DB</a:t>
             </a:r>
             <a:endParaRPr lang="en-US" dirty="0"/>
           </a:p>
@@ -1543,13 +1929,20 @@
     </p:spTree>
     <p:extLst>
       <p:ext uri="{BB962C8B-B14F-4D97-AF65-F5344CB8AC3E}">
-        <p14:creationId xmlns:p14="http://schemas.microsoft.com/office/powerpoint/2010/main" val="1884935358"/>
+        <p14:creationId xmlns:p14="http://schemas.microsoft.com/office/powerpoint/2010/main" val="2059606158"/>
       </p:ext>
     </p:extLst>
   </p:cSld>
   <p:clrMapOvr>
     <a:masterClrMapping/>
   </p:clrMapOvr>
+  <p:timing>
+    <p:tnLst>
+      <p:par>
+        <p:cTn id="1" dur="indefinite" restart="never" nodeType="tmRoot"/>
+      </p:par>
+    </p:tnLst>
+  </p:timing>
 </p:sld>
 </file>
 
@@ -1587,7 +1980,7 @@
           <a:p>
             <a:r>
               <a:rPr lang="en-US" dirty="0" smtClean="0"/>
-              <a:t>Code Walkthrough</a:t>
+              <a:t>5 of 6: </a:t>
             </a:r>
             <a:endParaRPr lang="en-US" dirty="0"/>
           </a:p>
@@ -1610,40 +2003,54 @@
           <a:p>
             <a:r>
               <a:rPr lang="en-US" dirty="0" smtClean="0"/>
-              <a:t>Visual 2012</a:t>
-            </a:r>
-          </a:p>
-          <a:p>
-            <a:r>
-              <a:rPr lang="en-US" dirty="0" smtClean="0"/>
-              <a:t>Add new field in Model</a:t>
-            </a:r>
-          </a:p>
-          <a:p>
-            <a:r>
-              <a:rPr lang="en-US" dirty="0" smtClean="0"/>
-              <a:t>Add a Migration</a:t>
-            </a:r>
-          </a:p>
-          <a:p>
-            <a:r>
-              <a:rPr lang="en-US" dirty="0" smtClean="0"/>
-              <a:t>Update Database</a:t>
-            </a:r>
-            <a:endParaRPr lang="en-US" dirty="0"/>
+              <a:t>Push code to source control</a:t>
+            </a:r>
+          </a:p>
+          <a:p>
+            <a:r>
+              <a:rPr lang="en-US" dirty="0" smtClean="0"/>
+              <a:t>Other developers pull and Update Database</a:t>
+            </a:r>
+          </a:p>
+          <a:p>
+            <a:r>
+              <a:rPr lang="en-US" dirty="0" smtClean="0"/>
+              <a:t>Migrate server DB via migrate.exe</a:t>
+            </a:r>
+          </a:p>
+          <a:p>
+            <a:r>
+              <a:rPr lang="en-US" dirty="0" smtClean="0"/>
+              <a:t>Use </a:t>
+            </a:r>
+            <a:r>
+              <a:rPr lang="en-US" dirty="0" err="1" smtClean="0"/>
+              <a:t>TeamCity</a:t>
+            </a:r>
+            <a:r>
+              <a:rPr lang="en-US" dirty="0" smtClean="0"/>
+              <a:t> to automate this</a:t>
+            </a:r>
           </a:p>
         </p:txBody>
       </p:sp>
     </p:spTree>
     <p:extLst>
       <p:ext uri="{BB962C8B-B14F-4D97-AF65-F5344CB8AC3E}">
-        <p14:creationId xmlns:p14="http://schemas.microsoft.com/office/powerpoint/2010/main" val="925839632"/>
+        <p14:creationId xmlns:p14="http://schemas.microsoft.com/office/powerpoint/2010/main" val="4246540840"/>
       </p:ext>
     </p:extLst>
   </p:cSld>
   <p:clrMapOvr>
     <a:masterClrMapping/>
   </p:clrMapOvr>
+  <p:timing>
+    <p:tnLst>
+      <p:par>
+        <p:cTn id="1" dur="indefinite" restart="never" nodeType="tmRoot"/>
+      </p:par>
+    </p:tnLst>
+  </p:timing>
 </p:sld>
 </file>
 
@@ -1680,8 +2087,12 @@
           <a:lstStyle/>
           <a:p>
             <a:r>
-              <a:rPr lang="en-US" dirty="0" smtClean="0"/>
-              <a:t>Conclusion</a:t>
+              <a:rPr lang="en-US" dirty="0"/>
+              <a:t>6</a:t>
+            </a:r>
+            <a:r>
+              <a:rPr lang="en-US" dirty="0" smtClean="0"/>
+              <a:t> of 6: </a:t>
             </a:r>
             <a:endParaRPr lang="en-US" dirty="0"/>
           </a:p>
@@ -1704,50 +2115,19 @@
           <a:p>
             <a:r>
               <a:rPr lang="en-US" dirty="0" smtClean="0"/>
-              <a:t>Code First Migrations allows:</a:t>
-            </a:r>
-          </a:p>
-          <a:p>
-            <a:pPr lvl="1"/>
-            <a:r>
-              <a:rPr lang="en-US" dirty="0" smtClean="0"/>
-              <a:t>Continuous development</a:t>
-            </a:r>
-          </a:p>
-          <a:p>
-            <a:pPr lvl="1"/>
-            <a:r>
-              <a:rPr lang="en-US" dirty="0" smtClean="0"/>
-              <a:t>Synchronization among team members</a:t>
-            </a:r>
-          </a:p>
-          <a:p>
-            <a:pPr lvl="1"/>
-            <a:r>
-              <a:rPr lang="en-US" dirty="0" smtClean="0"/>
-              <a:t>Database versioning</a:t>
-            </a:r>
-          </a:p>
-          <a:p>
-            <a:pPr lvl="1"/>
-            <a:r>
-              <a:rPr lang="en-US" dirty="0" smtClean="0"/>
-              <a:t>Server deployment</a:t>
-            </a:r>
-          </a:p>
-          <a:p>
-            <a:pPr marL="457200" lvl="1" indent="0">
-              <a:buNone/>
-            </a:pPr>
-            <a:endParaRPr lang="en-US" dirty="0"/>
-          </a:p>
-          <a:p>
-            <a:pPr marL="457200" lvl="1" indent="0">
-              <a:buNone/>
-            </a:pPr>
-            <a:r>
-              <a:rPr lang="en-US" dirty="0" smtClean="0"/>
-              <a:t>(diagram with star pattern)</a:t>
+              <a:t>Process Workflow</a:t>
+            </a:r>
+          </a:p>
+          <a:p>
+            <a:r>
+              <a:rPr lang="en-US" dirty="0" smtClean="0"/>
+              <a:t>Handle existing database</a:t>
+            </a:r>
+          </a:p>
+          <a:p>
+            <a:r>
+              <a:rPr lang="en-US" dirty="0" smtClean="0"/>
+              <a:t>Comply with enterprise requirements</a:t>
             </a:r>
             <a:endParaRPr lang="en-US" dirty="0"/>
           </a:p>
@@ -1756,13 +2136,20 @@
     </p:spTree>
     <p:extLst>
       <p:ext uri="{BB962C8B-B14F-4D97-AF65-F5344CB8AC3E}">
-        <p14:creationId xmlns:p14="http://schemas.microsoft.com/office/powerpoint/2010/main" val="1450648149"/>
+        <p14:creationId xmlns:p14="http://schemas.microsoft.com/office/powerpoint/2010/main" val="3114339337"/>
       </p:ext>
     </p:extLst>
   </p:cSld>
   <p:clrMapOvr>
     <a:masterClrMapping/>
   </p:clrMapOvr>
+  <p:timing>
+    <p:tnLst>
+      <p:par>
+        <p:cTn id="1" dur="indefinite" restart="never" nodeType="tmRoot"/>
+      </p:par>
+    </p:tnLst>
+  </p:timing>
 </p:sld>
 </file>
 
@@ -1800,7 +2187,7 @@
           <a:p>
             <a:r>
               <a:rPr lang="en-US" dirty="0" smtClean="0"/>
-              <a:t>About Me</a:t>
+              <a:t>Self-Correcting Worksheet</a:t>
             </a:r>
             <a:endParaRPr lang="en-US" dirty="0"/>
           </a:p>
@@ -1821,62 +2208,9 @@
           <a:bodyPr/>
           <a:lstStyle/>
           <a:p>
-            <a:pPr marL="0" indent="0">
-              <a:buNone/>
-            </a:pPr>
-            <a:r>
-              <a:rPr lang="en-US" dirty="0" smtClean="0"/>
-              <a:t>Shahed Chowdhuri</a:t>
-            </a:r>
-          </a:p>
-          <a:p>
-            <a:r>
-              <a:rPr lang="en-US" dirty="0" smtClean="0"/>
-              <a:t>Senior Consultant, </a:t>
-            </a:r>
-            <a:r>
-              <a:rPr lang="en-US" dirty="0" smtClean="0"/>
-              <a:t>Excella Consulting</a:t>
-            </a:r>
-          </a:p>
-          <a:p>
-            <a:r>
-              <a:rPr lang="en-US" dirty="0" smtClean="0"/>
-              <a:t>Email: </a:t>
-            </a:r>
-            <a:r>
-              <a:rPr lang="en-US" dirty="0" smtClean="0">
-                <a:hlinkClick r:id="rId2"/>
-              </a:rPr>
-              <a:t>shahed.chowdhuri@excella.com</a:t>
-            </a:r>
-            <a:endParaRPr lang="en-US" dirty="0" smtClean="0"/>
-          </a:p>
-          <a:p>
-            <a:r>
-              <a:rPr lang="en-US" dirty="0" smtClean="0"/>
-              <a:t>Twitter: @</a:t>
-            </a:r>
-            <a:r>
-              <a:rPr lang="en-US" dirty="0" err="1" smtClean="0"/>
-              <a:t>shahedc</a:t>
-            </a:r>
-            <a:endParaRPr lang="en-US" dirty="0" smtClean="0"/>
-          </a:p>
-          <a:p>
-            <a:r>
-              <a:rPr lang="en-US" dirty="0" smtClean="0"/>
-              <a:t>Blog: </a:t>
-            </a:r>
-            <a:r>
-              <a:rPr lang="en-US" dirty="0" smtClean="0">
-                <a:hlinkClick r:id="rId3"/>
-              </a:rPr>
-              <a:t>http://WakeUpAndCode.com</a:t>
-            </a:r>
-            <a:r>
-              <a:rPr lang="en-US" dirty="0" smtClean="0"/>
-              <a:t> </a:t>
+            <a:r>
+              <a:rPr lang="en-US" dirty="0" smtClean="0"/>
+              <a:t>Fill in the blanks (if time permits)</a:t>
             </a:r>
             <a:endParaRPr lang="en-US" dirty="0"/>
           </a:p>
@@ -1885,47 +2219,24 @@
     </p:spTree>
     <p:extLst>
       <p:ext uri="{BB962C8B-B14F-4D97-AF65-F5344CB8AC3E}">
-        <p14:creationId xmlns:p14="http://schemas.microsoft.com/office/powerpoint/2010/main" val="2288945912"/>
+        <p14:creationId xmlns:p14="http://schemas.microsoft.com/office/powerpoint/2010/main" val="1884935358"/>
       </p:ext>
     </p:extLst>
   </p:cSld>
   <p:clrMapOvr>
     <a:masterClrMapping/>
   </p:clrMapOvr>
+  <p:timing>
+    <p:tnLst>
+      <p:par>
+        <p:cTn id="1" dur="indefinite" restart="never" nodeType="tmRoot"/>
+      </p:par>
+    </p:tnLst>
+  </p:timing>
 </p:sld>
 </file>
 
 <file path=ppt/slides/slide15.xml><?xml version="1.0" encoding="utf-8"?>
-<p:sld xmlns:a="http://schemas.openxmlformats.org/drawingml/2006/main" xmlns:r="http://schemas.openxmlformats.org/officeDocument/2006/relationships" xmlns:p="http://schemas.openxmlformats.org/presentationml/2006/main">
-  <p:cSld>
-    <p:spTree>
-      <p:nvGrpSpPr>
-        <p:cNvPr id="1" name=""/>
-        <p:cNvGrpSpPr/>
-        <p:nvPr/>
-      </p:nvGrpSpPr>
-      <p:grpSpPr>
-        <a:xfrm>
-          <a:off x="0" y="0"/>
-          <a:ext cx="0" cy="0"/>
-          <a:chOff x="0" y="0"/>
-          <a:chExt cx="0" cy="0"/>
-        </a:xfrm>
-      </p:grpSpPr>
-    </p:spTree>
-    <p:extLst>
-      <p:ext uri="{BB962C8B-B14F-4D97-AF65-F5344CB8AC3E}">
-        <p14:creationId xmlns:p14="http://schemas.microsoft.com/office/powerpoint/2010/main" val="2404542755"/>
-      </p:ext>
-    </p:extLst>
-  </p:cSld>
-  <p:clrMapOvr>
-    <a:masterClrMapping/>
-  </p:clrMapOvr>
-</p:sld>
-</file>
-
-<file path=ppt/slides/slide2.xml><?xml version="1.0" encoding="utf-8"?>
 <p:sld xmlns:a="http://schemas.openxmlformats.org/drawingml/2006/main" xmlns:r="http://schemas.openxmlformats.org/officeDocument/2006/relationships" xmlns:p="http://schemas.openxmlformats.org/presentationml/2006/main">
   <p:cSld>
     <p:spTree>
@@ -1959,7 +2270,7 @@
           <a:p>
             <a:r>
               <a:rPr lang="en-US" dirty="0" smtClean="0"/>
-              <a:t>Tech Check</a:t>
+              <a:t>Code Walkthrough</a:t>
             </a:r>
             <a:endParaRPr lang="en-US" dirty="0"/>
           </a:p>
@@ -1982,62 +2293,1623 @@
           <a:p>
             <a:r>
               <a:rPr lang="en-US" dirty="0" smtClean="0"/>
-              <a:t>Are you familiar with:</a:t>
-            </a:r>
-          </a:p>
-          <a:p>
-            <a:pPr lvl="1"/>
-            <a:r>
-              <a:rPr lang="en-US" dirty="0" smtClean="0"/>
-              <a:t>ASP.NET MVC?</a:t>
-            </a:r>
-          </a:p>
-          <a:p>
-            <a:pPr lvl="1"/>
-            <a:r>
-              <a:rPr lang="en-US" dirty="0" smtClean="0"/>
-              <a:t>Entity Framework?</a:t>
-            </a:r>
-          </a:p>
-          <a:p>
-            <a:pPr lvl="1"/>
-            <a:r>
-              <a:rPr lang="en-US" dirty="0" smtClean="0"/>
-              <a:t>Code First development?</a:t>
-            </a:r>
-          </a:p>
-          <a:p>
-            <a:pPr lvl="1"/>
-            <a:r>
-              <a:rPr lang="en-US" dirty="0" smtClean="0"/>
-              <a:t>Code First Migrations?</a:t>
-            </a:r>
-          </a:p>
-          <a:p>
-            <a:pPr lvl="1"/>
+              <a:t>Visual 2012</a:t>
+            </a:r>
+          </a:p>
+          <a:p>
+            <a:r>
+              <a:rPr lang="en-US" dirty="0" smtClean="0"/>
+              <a:t>Add new field in Model</a:t>
+            </a:r>
+          </a:p>
+          <a:p>
+            <a:r>
+              <a:rPr lang="en-US" dirty="0" smtClean="0"/>
+              <a:t>Add a Migration</a:t>
+            </a:r>
+          </a:p>
+          <a:p>
+            <a:r>
+              <a:rPr lang="en-US" dirty="0" smtClean="0"/>
+              <a:t>Update Database</a:t>
+            </a:r>
             <a:endParaRPr lang="en-US" dirty="0"/>
-          </a:p>
-          <a:p>
-            <a:pPr marL="457200" lvl="1" indent="0">
-              <a:buNone/>
-            </a:pPr>
-            <a:r>
-              <a:rPr lang="en-US" dirty="0" smtClean="0"/>
-              <a:t>(slow-reveal diagram + ask the audience)</a:t>
-            </a:r>
           </a:p>
         </p:txBody>
       </p:sp>
     </p:spTree>
     <p:extLst>
       <p:ext uri="{BB962C8B-B14F-4D97-AF65-F5344CB8AC3E}">
-        <p14:creationId xmlns:p14="http://schemas.microsoft.com/office/powerpoint/2010/main" val="1156631515"/>
+        <p14:creationId xmlns:p14="http://schemas.microsoft.com/office/powerpoint/2010/main" val="925839632"/>
       </p:ext>
     </p:extLst>
   </p:cSld>
   <p:clrMapOvr>
     <a:masterClrMapping/>
   </p:clrMapOvr>
+  <p:timing>
+    <p:tnLst>
+      <p:par>
+        <p:cTn id="1" dur="indefinite" restart="never" nodeType="tmRoot"/>
+      </p:par>
+    </p:tnLst>
+  </p:timing>
+</p:sld>
+</file>
+
+<file path=ppt/slides/slide16.xml><?xml version="1.0" encoding="utf-8"?>
+<p:sld xmlns:a="http://schemas.openxmlformats.org/drawingml/2006/main" xmlns:r="http://schemas.openxmlformats.org/officeDocument/2006/relationships" xmlns:p="http://schemas.openxmlformats.org/presentationml/2006/main">
+  <p:cSld>
+    <p:spTree>
+      <p:nvGrpSpPr>
+        <p:cNvPr id="1" name=""/>
+        <p:cNvGrpSpPr/>
+        <p:nvPr/>
+      </p:nvGrpSpPr>
+      <p:grpSpPr>
+        <a:xfrm>
+          <a:off x="0" y="0"/>
+          <a:ext cx="0" cy="0"/>
+          <a:chOff x="0" y="0"/>
+          <a:chExt cx="0" cy="0"/>
+        </a:xfrm>
+      </p:grpSpPr>
+      <p:sp>
+        <p:nvSpPr>
+          <p:cNvPr id="2" name="Title 1"/>
+          <p:cNvSpPr>
+            <a:spLocks noGrp="1"/>
+          </p:cNvSpPr>
+          <p:nvPr>
+            <p:ph type="title"/>
+          </p:nvPr>
+        </p:nvSpPr>
+        <p:spPr/>
+        <p:txBody>
+          <a:bodyPr/>
+          <a:lstStyle/>
+          <a:p>
+            <a:r>
+              <a:rPr lang="en-US" dirty="0" smtClean="0"/>
+              <a:t>Conclusion</a:t>
+            </a:r>
+            <a:endParaRPr lang="en-US" dirty="0"/>
+          </a:p>
+        </p:txBody>
+      </p:sp>
+      <p:sp>
+        <p:nvSpPr>
+          <p:cNvPr id="3" name="Content Placeholder 2"/>
+          <p:cNvSpPr>
+            <a:spLocks noGrp="1"/>
+          </p:cNvSpPr>
+          <p:nvPr>
+            <p:ph idx="1"/>
+          </p:nvPr>
+        </p:nvSpPr>
+        <p:spPr/>
+        <p:txBody>
+          <a:bodyPr/>
+          <a:lstStyle/>
+          <a:p>
+            <a:r>
+              <a:rPr lang="en-US" dirty="0" smtClean="0"/>
+              <a:t>Code First Migrations allows:</a:t>
+            </a:r>
+          </a:p>
+          <a:p>
+            <a:pPr lvl="1"/>
+            <a:r>
+              <a:rPr lang="en-US" dirty="0" smtClean="0"/>
+              <a:t>Continuous development</a:t>
+            </a:r>
+          </a:p>
+          <a:p>
+            <a:pPr lvl="1"/>
+            <a:r>
+              <a:rPr lang="en-US" dirty="0" smtClean="0"/>
+              <a:t>Synchronization among team members</a:t>
+            </a:r>
+          </a:p>
+          <a:p>
+            <a:pPr lvl="1"/>
+            <a:r>
+              <a:rPr lang="en-US" dirty="0" smtClean="0"/>
+              <a:t>Database versioning</a:t>
+            </a:r>
+          </a:p>
+          <a:p>
+            <a:pPr lvl="1"/>
+            <a:r>
+              <a:rPr lang="en-US" dirty="0" smtClean="0"/>
+              <a:t>Server deployment</a:t>
+            </a:r>
+          </a:p>
+          <a:p>
+            <a:pPr marL="457200" lvl="1" indent="0">
+              <a:buNone/>
+            </a:pPr>
+            <a:endParaRPr lang="en-US" dirty="0"/>
+          </a:p>
+          <a:p>
+            <a:pPr marL="457200" lvl="1" indent="0">
+              <a:buNone/>
+            </a:pPr>
+            <a:r>
+              <a:rPr lang="en-US" dirty="0" smtClean="0"/>
+              <a:t>(diagram with star pattern)</a:t>
+            </a:r>
+            <a:endParaRPr lang="en-US" dirty="0"/>
+          </a:p>
+        </p:txBody>
+      </p:sp>
+    </p:spTree>
+    <p:extLst>
+      <p:ext uri="{BB962C8B-B14F-4D97-AF65-F5344CB8AC3E}">
+        <p14:creationId xmlns:p14="http://schemas.microsoft.com/office/powerpoint/2010/main" val="1450648149"/>
+      </p:ext>
+    </p:extLst>
+  </p:cSld>
+  <p:clrMapOvr>
+    <a:masterClrMapping/>
+  </p:clrMapOvr>
+  <p:timing>
+    <p:tnLst>
+      <p:par>
+        <p:cTn id="1" dur="indefinite" restart="never" nodeType="tmRoot"/>
+      </p:par>
+    </p:tnLst>
+  </p:timing>
+</p:sld>
+</file>
+
+<file path=ppt/slides/slide17.xml><?xml version="1.0" encoding="utf-8"?>
+<p:sld xmlns:a="http://schemas.openxmlformats.org/drawingml/2006/main" xmlns:r="http://schemas.openxmlformats.org/officeDocument/2006/relationships" xmlns:p="http://schemas.openxmlformats.org/presentationml/2006/main">
+  <p:cSld>
+    <p:spTree>
+      <p:nvGrpSpPr>
+        <p:cNvPr id="1" name=""/>
+        <p:cNvGrpSpPr/>
+        <p:nvPr/>
+      </p:nvGrpSpPr>
+      <p:grpSpPr>
+        <a:xfrm>
+          <a:off x="0" y="0"/>
+          <a:ext cx="0" cy="0"/>
+          <a:chOff x="0" y="0"/>
+          <a:chExt cx="0" cy="0"/>
+        </a:xfrm>
+      </p:grpSpPr>
+      <p:sp>
+        <p:nvSpPr>
+          <p:cNvPr id="2" name="Title 1"/>
+          <p:cNvSpPr>
+            <a:spLocks noGrp="1"/>
+          </p:cNvSpPr>
+          <p:nvPr>
+            <p:ph type="title"/>
+          </p:nvPr>
+        </p:nvSpPr>
+        <p:spPr/>
+        <p:txBody>
+          <a:bodyPr/>
+          <a:lstStyle/>
+          <a:p>
+            <a:r>
+              <a:rPr lang="en-US" sz="6600" dirty="0" smtClean="0"/>
+              <a:t>Domain</a:t>
+            </a:r>
+            <a:endParaRPr lang="en-US" sz="6600" dirty="0"/>
+          </a:p>
+        </p:txBody>
+      </p:sp>
+      <p:sp>
+        <p:nvSpPr>
+          <p:cNvPr id="4" name="TextBox 3"/>
+          <p:cNvSpPr txBox="1"/>
+          <p:nvPr/>
+        </p:nvSpPr>
+        <p:spPr>
+          <a:xfrm>
+            <a:off x="381000" y="2514600"/>
+            <a:ext cx="8686800" cy="461665"/>
+          </a:xfrm>
+          <a:prstGeom prst="rect">
+            <a:avLst/>
+          </a:prstGeom>
+          <a:noFill/>
+        </p:spPr>
+        <p:txBody>
+          <a:bodyPr wrap="square" rtlCol="0">
+            <a:spAutoFit/>
+          </a:bodyPr>
+          <a:lstStyle/>
+          <a:p>
+            <a:pPr algn="ctr"/>
+            <a:r>
+              <a:rPr lang="en-US" dirty="0" smtClean="0"/>
+              <a:t>By </a:t>
+            </a:r>
+            <a:r>
+              <a:rPr lang="en-US" dirty="0" smtClean="0"/>
+              <a:t>Sahil Talwar</a:t>
+            </a:r>
+            <a:endParaRPr lang="en-US" dirty="0"/>
+          </a:p>
+        </p:txBody>
+      </p:sp>
+    </p:spTree>
+    <p:extLst>
+      <p:ext uri="{BB962C8B-B14F-4D97-AF65-F5344CB8AC3E}">
+        <p14:creationId xmlns:p14="http://schemas.microsoft.com/office/powerpoint/2010/main" val="1716813127"/>
+      </p:ext>
+    </p:extLst>
+  </p:cSld>
+  <p:clrMapOvr>
+    <a:masterClrMapping/>
+  </p:clrMapOvr>
+</p:sld>
+</file>
+
+<file path=ppt/slides/slide18.xml><?xml version="1.0" encoding="utf-8"?>
+<p:sld xmlns:a="http://schemas.openxmlformats.org/drawingml/2006/main" xmlns:r="http://schemas.openxmlformats.org/officeDocument/2006/relationships" xmlns:p="http://schemas.openxmlformats.org/presentationml/2006/main">
+  <p:cSld>
+    <p:spTree>
+      <p:nvGrpSpPr>
+        <p:cNvPr id="1" name=""/>
+        <p:cNvGrpSpPr/>
+        <p:nvPr/>
+      </p:nvGrpSpPr>
+      <p:grpSpPr>
+        <a:xfrm>
+          <a:off x="0" y="0"/>
+          <a:ext cx="0" cy="0"/>
+          <a:chOff x="0" y="0"/>
+          <a:chExt cx="0" cy="0"/>
+        </a:xfrm>
+      </p:grpSpPr>
+      <p:sp>
+        <p:nvSpPr>
+          <p:cNvPr id="2" name="Title 1"/>
+          <p:cNvSpPr>
+            <a:spLocks noGrp="1"/>
+          </p:cNvSpPr>
+          <p:nvPr>
+            <p:ph type="title"/>
+          </p:nvPr>
+        </p:nvSpPr>
+        <p:spPr/>
+        <p:txBody>
+          <a:bodyPr/>
+          <a:lstStyle/>
+          <a:p>
+            <a:r>
+              <a:rPr lang="en-US" dirty="0" smtClean="0"/>
+              <a:t>(placeholder)</a:t>
+            </a:r>
+            <a:endParaRPr lang="en-US" dirty="0"/>
+          </a:p>
+        </p:txBody>
+      </p:sp>
+      <p:sp>
+        <p:nvSpPr>
+          <p:cNvPr id="3" name="Content Placeholder 2"/>
+          <p:cNvSpPr>
+            <a:spLocks noGrp="1"/>
+          </p:cNvSpPr>
+          <p:nvPr>
+            <p:ph idx="1"/>
+          </p:nvPr>
+        </p:nvSpPr>
+        <p:spPr/>
+        <p:txBody>
+          <a:bodyPr/>
+          <a:lstStyle/>
+          <a:p>
+            <a:r>
+              <a:rPr lang="en-US" dirty="0" err="1" smtClean="0"/>
+              <a:t>Sahil’s</a:t>
+            </a:r>
+            <a:r>
+              <a:rPr lang="en-US" dirty="0" smtClean="0"/>
+              <a:t> slides go here</a:t>
+            </a:r>
+            <a:endParaRPr lang="en-US" dirty="0"/>
+          </a:p>
+        </p:txBody>
+      </p:sp>
+    </p:spTree>
+    <p:extLst>
+      <p:ext uri="{BB962C8B-B14F-4D97-AF65-F5344CB8AC3E}">
+        <p14:creationId xmlns:p14="http://schemas.microsoft.com/office/powerpoint/2010/main" val="1854423820"/>
+      </p:ext>
+    </p:extLst>
+  </p:cSld>
+  <p:clrMapOvr>
+    <a:masterClrMapping/>
+  </p:clrMapOvr>
+</p:sld>
+</file>
+
+<file path=ppt/slides/slide19.xml><?xml version="1.0" encoding="utf-8"?>
+<p:sld xmlns:a="http://schemas.openxmlformats.org/drawingml/2006/main" xmlns:r="http://schemas.openxmlformats.org/officeDocument/2006/relationships" xmlns:p="http://schemas.openxmlformats.org/presentationml/2006/main">
+  <p:cSld>
+    <p:spTree>
+      <p:nvGrpSpPr>
+        <p:cNvPr id="1" name=""/>
+        <p:cNvGrpSpPr/>
+        <p:nvPr/>
+      </p:nvGrpSpPr>
+      <p:grpSpPr>
+        <a:xfrm>
+          <a:off x="0" y="0"/>
+          <a:ext cx="0" cy="0"/>
+          <a:chOff x="0" y="0"/>
+          <a:chExt cx="0" cy="0"/>
+        </a:xfrm>
+      </p:grpSpPr>
+      <p:sp>
+        <p:nvSpPr>
+          <p:cNvPr id="2" name="Title 1"/>
+          <p:cNvSpPr>
+            <a:spLocks noGrp="1"/>
+          </p:cNvSpPr>
+          <p:nvPr>
+            <p:ph type="title"/>
+          </p:nvPr>
+        </p:nvSpPr>
+        <p:spPr/>
+        <p:txBody>
+          <a:bodyPr/>
+          <a:lstStyle/>
+          <a:p>
+            <a:r>
+              <a:rPr lang="en-US" sz="6600" dirty="0" smtClean="0"/>
+              <a:t>Presentation</a:t>
+            </a:r>
+            <a:endParaRPr lang="en-US" sz="6600" dirty="0"/>
+          </a:p>
+        </p:txBody>
+      </p:sp>
+      <p:sp>
+        <p:nvSpPr>
+          <p:cNvPr id="4" name="TextBox 3"/>
+          <p:cNvSpPr txBox="1"/>
+          <p:nvPr/>
+        </p:nvSpPr>
+        <p:spPr>
+          <a:xfrm>
+            <a:off x="381000" y="2514600"/>
+            <a:ext cx="8686800" cy="461665"/>
+          </a:xfrm>
+          <a:prstGeom prst="rect">
+            <a:avLst/>
+          </a:prstGeom>
+          <a:noFill/>
+        </p:spPr>
+        <p:txBody>
+          <a:bodyPr wrap="square" rtlCol="0">
+            <a:spAutoFit/>
+          </a:bodyPr>
+          <a:lstStyle/>
+          <a:p>
+            <a:pPr algn="ctr"/>
+            <a:r>
+              <a:rPr lang="en-US" dirty="0" smtClean="0"/>
+              <a:t>By </a:t>
+            </a:r>
+            <a:r>
+              <a:rPr lang="en-US" dirty="0" smtClean="0"/>
+              <a:t>Doguhan Uluca</a:t>
+            </a:r>
+            <a:endParaRPr lang="en-US" dirty="0"/>
+          </a:p>
+        </p:txBody>
+      </p:sp>
+    </p:spTree>
+    <p:extLst>
+      <p:ext uri="{BB962C8B-B14F-4D97-AF65-F5344CB8AC3E}">
+        <p14:creationId xmlns:p14="http://schemas.microsoft.com/office/powerpoint/2010/main" val="29633872"/>
+      </p:ext>
+    </p:extLst>
+  </p:cSld>
+  <p:clrMapOvr>
+    <a:masterClrMapping/>
+  </p:clrMapOvr>
+</p:sld>
+</file>
+
+<file path=ppt/slides/slide2.xml><?xml version="1.0" encoding="utf-8"?>
+<p:sld xmlns:a="http://schemas.openxmlformats.org/drawingml/2006/main" xmlns:r="http://schemas.openxmlformats.org/officeDocument/2006/relationships" xmlns:p="http://schemas.openxmlformats.org/presentationml/2006/main">
+  <p:cSld>
+    <p:spTree>
+      <p:nvGrpSpPr>
+        <p:cNvPr id="1" name=""/>
+        <p:cNvGrpSpPr/>
+        <p:nvPr/>
+      </p:nvGrpSpPr>
+      <p:grpSpPr>
+        <a:xfrm>
+          <a:off x="0" y="0"/>
+          <a:ext cx="0" cy="0"/>
+          <a:chOff x="0" y="0"/>
+          <a:chExt cx="0" cy="0"/>
+        </a:xfrm>
+      </p:grpSpPr>
+      <p:sp>
+        <p:nvSpPr>
+          <p:cNvPr id="4" name="Title 3"/>
+          <p:cNvSpPr>
+            <a:spLocks noGrp="1"/>
+          </p:cNvSpPr>
+          <p:nvPr>
+            <p:ph type="title"/>
+          </p:nvPr>
+        </p:nvSpPr>
+        <p:spPr/>
+        <p:txBody>
+          <a:bodyPr>
+            <a:normAutofit fontScale="90000"/>
+          </a:bodyPr>
+          <a:lstStyle/>
+          <a:p>
+            <a:pPr algn="ctr"/>
+            <a:r>
+              <a:rPr lang="en-US" sz="5300" b="1" dirty="0"/>
+              <a:t>Thanks to our Sponsors</a:t>
+            </a:r>
+            <a:r>
+              <a:rPr lang="en-US" dirty="0" smtClean="0"/>
+              <a:t/>
+            </a:r>
+            <a:br>
+              <a:rPr lang="en-US" dirty="0" smtClean="0"/>
+            </a:br>
+            <a:r>
+              <a:rPr lang="en-US" b="1" dirty="0" smtClean="0"/>
+              <a:t>for keeping the fires lit</a:t>
+            </a:r>
+            <a:endParaRPr lang="en-US" b="1" dirty="0"/>
+          </a:p>
+        </p:txBody>
+      </p:sp>
+      <p:pic>
+        <p:nvPicPr>
+          <p:cNvPr id="5" name="Picture 4"/>
+          <p:cNvPicPr>
+            <a:picLocks noChangeAspect="1"/>
+          </p:cNvPicPr>
+          <p:nvPr/>
+        </p:nvPicPr>
+        <p:blipFill>
+          <a:blip r:embed="rId2">
+            <a:extLst>
+              <a:ext uri="{28A0092B-C50C-407E-A947-70E740481C1C}">
+                <a14:useLocalDpi xmlns:a14="http://schemas.microsoft.com/office/drawing/2010/main" val="0"/>
+              </a:ext>
+            </a:extLst>
+          </a:blip>
+          <a:stretch>
+            <a:fillRect/>
+          </a:stretch>
+        </p:blipFill>
+        <p:spPr>
+          <a:xfrm>
+            <a:off x="1" y="5819907"/>
+            <a:ext cx="4607143" cy="1038095"/>
+          </a:xfrm>
+          <a:prstGeom prst="rect">
+            <a:avLst/>
+          </a:prstGeom>
+        </p:spPr>
+      </p:pic>
+      <p:pic>
+        <p:nvPicPr>
+          <p:cNvPr id="12" name="Picture 11"/>
+          <p:cNvPicPr>
+            <a:picLocks noChangeAspect="1"/>
+          </p:cNvPicPr>
+          <p:nvPr/>
+        </p:nvPicPr>
+        <p:blipFill>
+          <a:blip r:embed="rId3">
+            <a:extLst>
+              <a:ext uri="{28A0092B-C50C-407E-A947-70E740481C1C}">
+                <a14:useLocalDpi xmlns:a14="http://schemas.microsoft.com/office/drawing/2010/main" val="0"/>
+              </a:ext>
+            </a:extLst>
+          </a:blip>
+          <a:stretch>
+            <a:fillRect/>
+          </a:stretch>
+        </p:blipFill>
+        <p:spPr>
+          <a:xfrm>
+            <a:off x="4001683" y="2356123"/>
+            <a:ext cx="2459941" cy="701225"/>
+          </a:xfrm>
+          <a:prstGeom prst="rect">
+            <a:avLst/>
+          </a:prstGeom>
+        </p:spPr>
+      </p:pic>
+      <p:pic>
+        <p:nvPicPr>
+          <p:cNvPr id="13" name="Picture 2" descr="http://novacodecamp.org/Portals/0/Sponsors/Excella%20Logo%20Full%20Color.png"/>
+          <p:cNvPicPr>
+            <a:picLocks noChangeAspect="1" noChangeArrowheads="1"/>
+          </p:cNvPicPr>
+          <p:nvPr/>
+        </p:nvPicPr>
+        <p:blipFill>
+          <a:blip r:embed="rId4" cstate="print">
+            <a:extLst>
+              <a:ext uri="{28A0092B-C50C-407E-A947-70E740481C1C}">
+                <a14:useLocalDpi xmlns:a14="http://schemas.microsoft.com/office/drawing/2010/main" val="0"/>
+              </a:ext>
+            </a:extLst>
+          </a:blip>
+          <a:srcRect/>
+          <a:stretch>
+            <a:fillRect/>
+          </a:stretch>
+        </p:blipFill>
+        <p:spPr bwMode="auto">
+          <a:xfrm>
+            <a:off x="279769" y="1801633"/>
+            <a:ext cx="1550109" cy="1597083"/>
+          </a:xfrm>
+          <a:prstGeom prst="rect">
+            <a:avLst/>
+          </a:prstGeom>
+          <a:noFill/>
+          <a:extLst>
+            <a:ext uri="{909E8E84-426E-40DD-AFC4-6F175D3DCCD1}">
+              <a14:hiddenFill xmlns:a14="http://schemas.microsoft.com/office/drawing/2010/main">
+                <a:solidFill>
+                  <a:srgbClr val="FFFFFF"/>
+                </a:solidFill>
+              </a14:hiddenFill>
+            </a:ext>
+          </a:extLst>
+        </p:spPr>
+      </p:pic>
+      <p:pic>
+        <p:nvPicPr>
+          <p:cNvPr id="14" name="Picture 4" descr="http://novacodecamp.org/Portals/0/Sponsors/Knowlogy.gif"/>
+          <p:cNvPicPr>
+            <a:picLocks noChangeAspect="1" noChangeArrowheads="1"/>
+          </p:cNvPicPr>
+          <p:nvPr/>
+        </p:nvPicPr>
+        <p:blipFill>
+          <a:blip r:embed="rId5">
+            <a:extLst>
+              <a:ext uri="{28A0092B-C50C-407E-A947-70E740481C1C}">
+                <a14:useLocalDpi xmlns:a14="http://schemas.microsoft.com/office/drawing/2010/main" val="0"/>
+              </a:ext>
+            </a:extLst>
+          </a:blip>
+          <a:srcRect/>
+          <a:stretch>
+            <a:fillRect/>
+          </a:stretch>
+        </p:blipFill>
+        <p:spPr bwMode="auto">
+          <a:xfrm>
+            <a:off x="2104308" y="2329019"/>
+            <a:ext cx="1622944" cy="798455"/>
+          </a:xfrm>
+          <a:prstGeom prst="rect">
+            <a:avLst/>
+          </a:prstGeom>
+          <a:noFill/>
+          <a:extLst>
+            <a:ext uri="{909E8E84-426E-40DD-AFC4-6F175D3DCCD1}">
+              <a14:hiddenFill xmlns:a14="http://schemas.microsoft.com/office/drawing/2010/main">
+                <a:solidFill>
+                  <a:srgbClr val="FFFFFF"/>
+                </a:solidFill>
+              </a14:hiddenFill>
+            </a:ext>
+          </a:extLst>
+        </p:spPr>
+      </p:pic>
+      <p:pic>
+        <p:nvPicPr>
+          <p:cNvPr id="15" name="Picture 6" descr="http://novacodecamp.org/Portals/0/Sponsors/NGPVAN_Logo.png"/>
+          <p:cNvPicPr>
+            <a:picLocks noChangeAspect="1" noChangeArrowheads="1"/>
+          </p:cNvPicPr>
+          <p:nvPr/>
+        </p:nvPicPr>
+        <p:blipFill>
+          <a:blip r:embed="rId6">
+            <a:extLst>
+              <a:ext uri="{28A0092B-C50C-407E-A947-70E740481C1C}">
+                <a14:useLocalDpi xmlns:a14="http://schemas.microsoft.com/office/drawing/2010/main" val="0"/>
+              </a:ext>
+            </a:extLst>
+          </a:blip>
+          <a:srcRect/>
+          <a:stretch>
+            <a:fillRect/>
+          </a:stretch>
+        </p:blipFill>
+        <p:spPr bwMode="auto">
+          <a:xfrm>
+            <a:off x="6736053" y="2285998"/>
+            <a:ext cx="2185570" cy="841475"/>
+          </a:xfrm>
+          <a:prstGeom prst="rect">
+            <a:avLst/>
+          </a:prstGeom>
+          <a:noFill/>
+          <a:extLst>
+            <a:ext uri="{909E8E84-426E-40DD-AFC4-6F175D3DCCD1}">
+              <a14:hiddenFill xmlns:a14="http://schemas.microsoft.com/office/drawing/2010/main">
+                <a:solidFill>
+                  <a:srgbClr val="FFFFFF"/>
+                </a:solidFill>
+              </a14:hiddenFill>
+            </a:ext>
+          </a:extLst>
+        </p:spPr>
+      </p:pic>
+      <p:pic>
+        <p:nvPicPr>
+          <p:cNvPr id="16" name="Picture 8" descr="DiscountASP.Net"/>
+          <p:cNvPicPr>
+            <a:picLocks noChangeAspect="1" noChangeArrowheads="1"/>
+          </p:cNvPicPr>
+          <p:nvPr/>
+        </p:nvPicPr>
+        <p:blipFill>
+          <a:blip r:embed="rId7">
+            <a:extLst>
+              <a:ext uri="{28A0092B-C50C-407E-A947-70E740481C1C}">
+                <a14:useLocalDpi xmlns:a14="http://schemas.microsoft.com/office/drawing/2010/main" val="0"/>
+              </a:ext>
+            </a:extLst>
+          </a:blip>
+          <a:srcRect/>
+          <a:stretch>
+            <a:fillRect/>
+          </a:stretch>
+        </p:blipFill>
+        <p:spPr bwMode="auto">
+          <a:xfrm>
+            <a:off x="1246417" y="4039137"/>
+            <a:ext cx="1204787" cy="738936"/>
+          </a:xfrm>
+          <a:prstGeom prst="rect">
+            <a:avLst/>
+          </a:prstGeom>
+          <a:noFill/>
+          <a:extLst>
+            <a:ext uri="{909E8E84-426E-40DD-AFC4-6F175D3DCCD1}">
+              <a14:hiddenFill xmlns:a14="http://schemas.microsoft.com/office/drawing/2010/main">
+                <a:solidFill>
+                  <a:srgbClr val="FFFFFF"/>
+                </a:solidFill>
+              </a14:hiddenFill>
+            </a:ext>
+          </a:extLst>
+        </p:spPr>
+      </p:pic>
+      <p:pic>
+        <p:nvPicPr>
+          <p:cNvPr id="17" name="Picture 10" descr="http://novacodecamp.org/Portals/0/Sponsors/OReilly.jpg"/>
+          <p:cNvPicPr>
+            <a:picLocks noChangeAspect="1" noChangeArrowheads="1"/>
+          </p:cNvPicPr>
+          <p:nvPr/>
+        </p:nvPicPr>
+        <p:blipFill>
+          <a:blip r:embed="rId8">
+            <a:extLst>
+              <a:ext uri="{28A0092B-C50C-407E-A947-70E740481C1C}">
+                <a14:useLocalDpi xmlns:a14="http://schemas.microsoft.com/office/drawing/2010/main" val="0"/>
+              </a:ext>
+            </a:extLst>
+          </a:blip>
+          <a:srcRect/>
+          <a:stretch>
+            <a:fillRect/>
+          </a:stretch>
+        </p:blipFill>
+        <p:spPr bwMode="auto">
+          <a:xfrm>
+            <a:off x="3155567" y="4013636"/>
+            <a:ext cx="1983401" cy="778432"/>
+          </a:xfrm>
+          <a:prstGeom prst="rect">
+            <a:avLst/>
+          </a:prstGeom>
+          <a:noFill/>
+          <a:extLst>
+            <a:ext uri="{909E8E84-426E-40DD-AFC4-6F175D3DCCD1}">
+              <a14:hiddenFill xmlns:a14="http://schemas.microsoft.com/office/drawing/2010/main">
+                <a:solidFill>
+                  <a:srgbClr val="FFFFFF"/>
+                </a:solidFill>
+              </a14:hiddenFill>
+            </a:ext>
+          </a:extLst>
+        </p:spPr>
+      </p:pic>
+      <p:pic>
+        <p:nvPicPr>
+          <p:cNvPr id="18" name="Picture 12" descr="http://novacodecamp.org/Portals/0/Sponsors/pluralsight-fullcolor-250x55-v1.png"/>
+          <p:cNvPicPr>
+            <a:picLocks noChangeAspect="1" noChangeArrowheads="1"/>
+          </p:cNvPicPr>
+          <p:nvPr/>
+        </p:nvPicPr>
+        <p:blipFill>
+          <a:blip r:embed="rId9">
+            <a:extLst>
+              <a:ext uri="{28A0092B-C50C-407E-A947-70E740481C1C}">
+                <a14:useLocalDpi xmlns:a14="http://schemas.microsoft.com/office/drawing/2010/main" val="0"/>
+              </a:ext>
+            </a:extLst>
+          </a:blip>
+          <a:srcRect/>
+          <a:stretch>
+            <a:fillRect/>
+          </a:stretch>
+        </p:blipFill>
+        <p:spPr bwMode="auto">
+          <a:xfrm>
+            <a:off x="5843329" y="4044892"/>
+            <a:ext cx="2440634" cy="715920"/>
+          </a:xfrm>
+          <a:prstGeom prst="rect">
+            <a:avLst/>
+          </a:prstGeom>
+          <a:noFill/>
+          <a:extLst>
+            <a:ext uri="{909E8E84-426E-40DD-AFC4-6F175D3DCCD1}">
+              <a14:hiddenFill xmlns:a14="http://schemas.microsoft.com/office/drawing/2010/main">
+                <a:solidFill>
+                  <a:srgbClr val="FFFFFF"/>
+                </a:solidFill>
+              </a14:hiddenFill>
+            </a:ext>
+          </a:extLst>
+        </p:spPr>
+      </p:pic>
+    </p:spTree>
+    <p:extLst>
+      <p:ext uri="{BB962C8B-B14F-4D97-AF65-F5344CB8AC3E}">
+        <p14:creationId xmlns:p14="http://schemas.microsoft.com/office/powerpoint/2010/main" val="421852074"/>
+      </p:ext>
+    </p:extLst>
+  </p:cSld>
+  <p:clrMapOvr>
+    <a:masterClrMapping/>
+  </p:clrMapOvr>
+</p:sld>
+</file>
+
+<file path=ppt/slides/slide20.xml><?xml version="1.0" encoding="utf-8"?>
+<p:sld xmlns:a="http://schemas.openxmlformats.org/drawingml/2006/main" xmlns:r="http://schemas.openxmlformats.org/officeDocument/2006/relationships" xmlns:p="http://schemas.openxmlformats.org/presentationml/2006/main">
+  <p:cSld>
+    <p:spTree>
+      <p:nvGrpSpPr>
+        <p:cNvPr id="1" name=""/>
+        <p:cNvGrpSpPr/>
+        <p:nvPr/>
+      </p:nvGrpSpPr>
+      <p:grpSpPr>
+        <a:xfrm>
+          <a:off x="0" y="0"/>
+          <a:ext cx="0" cy="0"/>
+          <a:chOff x="0" y="0"/>
+          <a:chExt cx="0" cy="0"/>
+        </a:xfrm>
+      </p:grpSpPr>
+      <p:sp>
+        <p:nvSpPr>
+          <p:cNvPr id="2" name="Title 1"/>
+          <p:cNvSpPr>
+            <a:spLocks noGrp="1"/>
+          </p:cNvSpPr>
+          <p:nvPr>
+            <p:ph type="title"/>
+          </p:nvPr>
+        </p:nvSpPr>
+        <p:spPr/>
+        <p:txBody>
+          <a:bodyPr/>
+          <a:lstStyle/>
+          <a:p>
+            <a:r>
+              <a:rPr lang="en-US" dirty="0" smtClean="0"/>
+              <a:t>(placeholder)</a:t>
+            </a:r>
+            <a:endParaRPr lang="en-US" dirty="0"/>
+          </a:p>
+        </p:txBody>
+      </p:sp>
+      <p:sp>
+        <p:nvSpPr>
+          <p:cNvPr id="3" name="Content Placeholder 2"/>
+          <p:cNvSpPr>
+            <a:spLocks noGrp="1"/>
+          </p:cNvSpPr>
+          <p:nvPr>
+            <p:ph idx="1"/>
+          </p:nvPr>
+        </p:nvSpPr>
+        <p:spPr/>
+        <p:txBody>
+          <a:bodyPr/>
+          <a:lstStyle/>
+          <a:p>
+            <a:r>
+              <a:rPr lang="en-US" dirty="0" err="1" smtClean="0"/>
+              <a:t>Doguhan’s</a:t>
+            </a:r>
+            <a:r>
+              <a:rPr lang="en-US" dirty="0" smtClean="0"/>
+              <a:t> slides go here</a:t>
+            </a:r>
+            <a:endParaRPr lang="en-US" dirty="0"/>
+          </a:p>
+        </p:txBody>
+      </p:sp>
+    </p:spTree>
+    <p:extLst>
+      <p:ext uri="{BB962C8B-B14F-4D97-AF65-F5344CB8AC3E}">
+        <p14:creationId xmlns:p14="http://schemas.microsoft.com/office/powerpoint/2010/main" val="2854288032"/>
+      </p:ext>
+    </p:extLst>
+  </p:cSld>
+  <p:clrMapOvr>
+    <a:masterClrMapping/>
+  </p:clrMapOvr>
+</p:sld>
+</file>
+
+<file path=ppt/slides/slide21.xml><?xml version="1.0" encoding="utf-8"?>
+<p:sld xmlns:a="http://schemas.openxmlformats.org/drawingml/2006/main" xmlns:r="http://schemas.openxmlformats.org/officeDocument/2006/relationships" xmlns:p="http://schemas.openxmlformats.org/presentationml/2006/main">
+  <p:cSld>
+    <p:spTree>
+      <p:nvGrpSpPr>
+        <p:cNvPr id="1" name=""/>
+        <p:cNvGrpSpPr/>
+        <p:nvPr/>
+      </p:nvGrpSpPr>
+      <p:grpSpPr>
+        <a:xfrm>
+          <a:off x="0" y="0"/>
+          <a:ext cx="0" cy="0"/>
+          <a:chOff x="0" y="0"/>
+          <a:chExt cx="0" cy="0"/>
+        </a:xfrm>
+      </p:grpSpPr>
+      <p:sp>
+        <p:nvSpPr>
+          <p:cNvPr id="2" name="Title 1"/>
+          <p:cNvSpPr>
+            <a:spLocks noGrp="1"/>
+          </p:cNvSpPr>
+          <p:nvPr>
+            <p:ph type="title"/>
+          </p:nvPr>
+        </p:nvSpPr>
+        <p:spPr/>
+        <p:txBody>
+          <a:bodyPr/>
+          <a:lstStyle/>
+          <a:p>
+            <a:r>
+              <a:rPr lang="en-US" dirty="0" smtClean="0"/>
+              <a:t>About </a:t>
+            </a:r>
+            <a:r>
+              <a:rPr lang="en-US" dirty="0" smtClean="0"/>
+              <a:t>Us</a:t>
+            </a:r>
+            <a:endParaRPr lang="en-US" dirty="0"/>
+          </a:p>
+        </p:txBody>
+      </p:sp>
+      <p:sp>
+        <p:nvSpPr>
+          <p:cNvPr id="3" name="Content Placeholder 2"/>
+          <p:cNvSpPr>
+            <a:spLocks noGrp="1"/>
+          </p:cNvSpPr>
+          <p:nvPr>
+            <p:ph idx="1"/>
+          </p:nvPr>
+        </p:nvSpPr>
+        <p:spPr>
+          <a:xfrm>
+            <a:off x="1295400" y="1066801"/>
+            <a:ext cx="7315200" cy="1524000"/>
+          </a:xfrm>
+        </p:spPr>
+        <p:txBody>
+          <a:bodyPr/>
+          <a:lstStyle/>
+          <a:p>
+            <a:pPr marL="0" indent="0">
+              <a:buNone/>
+            </a:pPr>
+            <a:r>
+              <a:rPr lang="en-US" sz="2000" b="1" dirty="0" smtClean="0"/>
+              <a:t>Shahed </a:t>
+            </a:r>
+            <a:r>
+              <a:rPr lang="en-US" sz="2000" b="1" dirty="0" smtClean="0"/>
+              <a:t>Chowdhuri</a:t>
+            </a:r>
+            <a:endParaRPr lang="en-US" sz="2000" b="1" dirty="0" smtClean="0"/>
+          </a:p>
+          <a:p>
+            <a:r>
+              <a:rPr lang="en-US" sz="2000" dirty="0" smtClean="0"/>
+              <a:t>Email: </a:t>
+            </a:r>
+            <a:r>
+              <a:rPr lang="en-US" sz="2000" dirty="0" smtClean="0">
+                <a:hlinkClick r:id="rId2"/>
+              </a:rPr>
+              <a:t>shahed.chowdhuri@excella.com</a:t>
+            </a:r>
+            <a:endParaRPr lang="en-US" sz="2000" dirty="0" smtClean="0"/>
+          </a:p>
+          <a:p>
+            <a:r>
+              <a:rPr lang="en-US" sz="2000" dirty="0" smtClean="0"/>
+              <a:t>Twitter: @</a:t>
+            </a:r>
+            <a:r>
+              <a:rPr lang="en-US" sz="2000" dirty="0" err="1" smtClean="0"/>
+              <a:t>shahedc</a:t>
+            </a:r>
+            <a:endParaRPr lang="en-US" sz="2000" dirty="0" smtClean="0"/>
+          </a:p>
+          <a:p>
+            <a:r>
+              <a:rPr lang="en-US" sz="2000" dirty="0" smtClean="0"/>
+              <a:t>Web: </a:t>
+            </a:r>
+            <a:r>
+              <a:rPr lang="en-US" sz="2000" dirty="0" smtClean="0">
+                <a:hlinkClick r:id="rId3"/>
+              </a:rPr>
+              <a:t>http://WakeUpAndCode.com</a:t>
+            </a:r>
+            <a:r>
+              <a:rPr lang="en-US" sz="2000" dirty="0" smtClean="0"/>
+              <a:t> </a:t>
+            </a:r>
+            <a:endParaRPr lang="en-US" sz="2000" dirty="0"/>
+          </a:p>
+        </p:txBody>
+      </p:sp>
+      <p:sp>
+        <p:nvSpPr>
+          <p:cNvPr id="4" name="Content Placeholder 2"/>
+          <p:cNvSpPr txBox="1">
+            <a:spLocks/>
+          </p:cNvSpPr>
+          <p:nvPr/>
+        </p:nvSpPr>
+        <p:spPr>
+          <a:xfrm>
+            <a:off x="1295400" y="2667000"/>
+            <a:ext cx="7315200" cy="1524000"/>
+          </a:xfrm>
+          <a:prstGeom prst="rect">
+            <a:avLst/>
+          </a:prstGeom>
+        </p:spPr>
+        <p:txBody>
+          <a:bodyPr/>
+          <a:lstStyle>
+            <a:lvl1pPr marL="342900" indent="-342900" algn="l" rtl="0" eaLnBrk="1" fontAlgn="base" hangingPunct="1">
+              <a:spcBef>
+                <a:spcPct val="20000"/>
+              </a:spcBef>
+              <a:spcAft>
+                <a:spcPct val="0"/>
+              </a:spcAft>
+              <a:buChar char="•"/>
+              <a:defRPr sz="2800">
+                <a:solidFill>
+                  <a:srgbClr val="000072"/>
+                </a:solidFill>
+                <a:latin typeface="Calibri"/>
+                <a:ea typeface="ＭＳ Ｐゴシック" pitchFamily="34" charset="-128"/>
+                <a:cs typeface="ＭＳ Ｐゴシック"/>
+              </a:defRPr>
+            </a:lvl1pPr>
+            <a:lvl2pPr marL="742950" indent="-285750" algn="l" rtl="0" eaLnBrk="1" fontAlgn="base" hangingPunct="1">
+              <a:spcBef>
+                <a:spcPct val="20000"/>
+              </a:spcBef>
+              <a:spcAft>
+                <a:spcPct val="0"/>
+              </a:spcAft>
+              <a:buChar char="–"/>
+              <a:defRPr sz="2400">
+                <a:solidFill>
+                  <a:srgbClr val="000072"/>
+                </a:solidFill>
+                <a:latin typeface="Calibri"/>
+                <a:ea typeface="ＭＳ Ｐゴシック" pitchFamily="34" charset="-128"/>
+                <a:cs typeface="ＭＳ Ｐゴシック"/>
+              </a:defRPr>
+            </a:lvl2pPr>
+            <a:lvl3pPr marL="1143000" indent="-228600" algn="l" rtl="0" eaLnBrk="1" fontAlgn="base" hangingPunct="1">
+              <a:spcBef>
+                <a:spcPct val="20000"/>
+              </a:spcBef>
+              <a:spcAft>
+                <a:spcPct val="0"/>
+              </a:spcAft>
+              <a:buChar char="•"/>
+              <a:defRPr sz="2000">
+                <a:solidFill>
+                  <a:srgbClr val="000072"/>
+                </a:solidFill>
+                <a:latin typeface="Calibri"/>
+                <a:ea typeface="ＭＳ Ｐゴシック" pitchFamily="34" charset="-128"/>
+                <a:cs typeface="ＭＳ Ｐゴシック"/>
+              </a:defRPr>
+            </a:lvl3pPr>
+            <a:lvl4pPr marL="1600200" indent="-228600" algn="l" rtl="0" eaLnBrk="1" fontAlgn="base" hangingPunct="1">
+              <a:spcBef>
+                <a:spcPct val="20000"/>
+              </a:spcBef>
+              <a:spcAft>
+                <a:spcPct val="0"/>
+              </a:spcAft>
+              <a:buChar char="–"/>
+              <a:defRPr sz="2000">
+                <a:solidFill>
+                  <a:schemeClr val="tx1"/>
+                </a:solidFill>
+                <a:latin typeface="Calibri"/>
+                <a:ea typeface="ＭＳ Ｐゴシック" pitchFamily="34" charset="-128"/>
+                <a:cs typeface="ＭＳ Ｐゴシック"/>
+              </a:defRPr>
+            </a:lvl4pPr>
+            <a:lvl5pPr marL="2057400" indent="-228600" algn="l" rtl="0" eaLnBrk="1" fontAlgn="base" hangingPunct="1">
+              <a:spcBef>
+                <a:spcPct val="20000"/>
+              </a:spcBef>
+              <a:spcAft>
+                <a:spcPct val="0"/>
+              </a:spcAft>
+              <a:buChar char="»"/>
+              <a:defRPr sz="2000">
+                <a:solidFill>
+                  <a:schemeClr val="tx1"/>
+                </a:solidFill>
+                <a:latin typeface="Calibri"/>
+                <a:ea typeface="ＭＳ Ｐゴシック" pitchFamily="34" charset="-128"/>
+                <a:cs typeface="ＭＳ Ｐゴシック"/>
+              </a:defRPr>
+            </a:lvl5pPr>
+            <a:lvl6pPr marL="2514600" indent="-228600" algn="l" rtl="0" eaLnBrk="1" fontAlgn="base" hangingPunct="1">
+              <a:spcBef>
+                <a:spcPct val="20000"/>
+              </a:spcBef>
+              <a:spcAft>
+                <a:spcPct val="0"/>
+              </a:spcAft>
+              <a:buChar char="»"/>
+              <a:defRPr sz="2000">
+                <a:solidFill>
+                  <a:schemeClr val="tx1"/>
+                </a:solidFill>
+                <a:latin typeface="+mn-lt"/>
+                <a:ea typeface="+mn-ea"/>
+              </a:defRPr>
+            </a:lvl6pPr>
+            <a:lvl7pPr marL="2971800" indent="-228600" algn="l" rtl="0" eaLnBrk="1" fontAlgn="base" hangingPunct="1">
+              <a:spcBef>
+                <a:spcPct val="20000"/>
+              </a:spcBef>
+              <a:spcAft>
+                <a:spcPct val="0"/>
+              </a:spcAft>
+              <a:buChar char="»"/>
+              <a:defRPr sz="2000">
+                <a:solidFill>
+                  <a:schemeClr val="tx1"/>
+                </a:solidFill>
+                <a:latin typeface="+mn-lt"/>
+                <a:ea typeface="+mn-ea"/>
+              </a:defRPr>
+            </a:lvl7pPr>
+            <a:lvl8pPr marL="3429000" indent="-228600" algn="l" rtl="0" eaLnBrk="1" fontAlgn="base" hangingPunct="1">
+              <a:spcBef>
+                <a:spcPct val="20000"/>
+              </a:spcBef>
+              <a:spcAft>
+                <a:spcPct val="0"/>
+              </a:spcAft>
+              <a:buChar char="»"/>
+              <a:defRPr sz="2000">
+                <a:solidFill>
+                  <a:schemeClr val="tx1"/>
+                </a:solidFill>
+                <a:latin typeface="+mn-lt"/>
+                <a:ea typeface="+mn-ea"/>
+              </a:defRPr>
+            </a:lvl8pPr>
+            <a:lvl9pPr marL="3886200" indent="-228600" algn="l" rtl="0" eaLnBrk="1" fontAlgn="base" hangingPunct="1">
+              <a:spcBef>
+                <a:spcPct val="20000"/>
+              </a:spcBef>
+              <a:spcAft>
+                <a:spcPct val="0"/>
+              </a:spcAft>
+              <a:buChar char="»"/>
+              <a:defRPr sz="2000">
+                <a:solidFill>
+                  <a:schemeClr val="tx1"/>
+                </a:solidFill>
+                <a:latin typeface="+mn-lt"/>
+                <a:ea typeface="+mn-ea"/>
+              </a:defRPr>
+            </a:lvl9pPr>
+          </a:lstStyle>
+          <a:p>
+            <a:pPr marL="0" indent="0">
+              <a:buFontTx/>
+              <a:buNone/>
+            </a:pPr>
+            <a:r>
+              <a:rPr lang="en-US" sz="2000" b="1" dirty="0" smtClean="0"/>
+              <a:t>Sahil Talwar</a:t>
+            </a:r>
+          </a:p>
+          <a:p>
+            <a:r>
+              <a:rPr lang="en-US" sz="2000" dirty="0" smtClean="0"/>
+              <a:t>Email: </a:t>
+            </a:r>
+            <a:r>
+              <a:rPr lang="en-US" sz="2000" dirty="0" smtClean="0">
+                <a:hlinkClick r:id="rId4"/>
+              </a:rPr>
+              <a:t>sahil.talwar@excella.com</a:t>
+            </a:r>
+            <a:r>
+              <a:rPr lang="en-US" sz="2000" dirty="0" smtClean="0"/>
+              <a:t> </a:t>
+            </a:r>
+          </a:p>
+          <a:p>
+            <a:r>
+              <a:rPr lang="en-US" sz="2000" dirty="0" smtClean="0"/>
+              <a:t>Twitter: @sahiltalwar88</a:t>
+            </a:r>
+          </a:p>
+          <a:p>
+            <a:r>
+              <a:rPr lang="en-US" sz="2000" dirty="0" smtClean="0"/>
+              <a:t>Web: </a:t>
+            </a:r>
+            <a:r>
+              <a:rPr lang="en-US" sz="2000" dirty="0" smtClean="0">
+                <a:hlinkClick r:id="rId5"/>
+              </a:rPr>
+              <a:t>http://about.me/sahiltalwar</a:t>
+            </a:r>
+            <a:r>
+              <a:rPr lang="en-US" sz="2000" dirty="0" smtClean="0"/>
+              <a:t> </a:t>
+            </a:r>
+            <a:endParaRPr lang="en-US" sz="2000" dirty="0"/>
+          </a:p>
+        </p:txBody>
+      </p:sp>
+      <p:sp>
+        <p:nvSpPr>
+          <p:cNvPr id="5" name="Content Placeholder 2"/>
+          <p:cNvSpPr txBox="1">
+            <a:spLocks/>
+          </p:cNvSpPr>
+          <p:nvPr/>
+        </p:nvSpPr>
+        <p:spPr>
+          <a:xfrm>
+            <a:off x="1295400" y="4267200"/>
+            <a:ext cx="7315200" cy="1524000"/>
+          </a:xfrm>
+          <a:prstGeom prst="rect">
+            <a:avLst/>
+          </a:prstGeom>
+        </p:spPr>
+        <p:txBody>
+          <a:bodyPr/>
+          <a:lstStyle>
+            <a:lvl1pPr marL="342900" indent="-342900" algn="l" rtl="0" eaLnBrk="1" fontAlgn="base" hangingPunct="1">
+              <a:spcBef>
+                <a:spcPct val="20000"/>
+              </a:spcBef>
+              <a:spcAft>
+                <a:spcPct val="0"/>
+              </a:spcAft>
+              <a:buChar char="•"/>
+              <a:defRPr sz="2800">
+                <a:solidFill>
+                  <a:srgbClr val="000072"/>
+                </a:solidFill>
+                <a:latin typeface="Calibri"/>
+                <a:ea typeface="ＭＳ Ｐゴシック" pitchFamily="34" charset="-128"/>
+                <a:cs typeface="ＭＳ Ｐゴシック"/>
+              </a:defRPr>
+            </a:lvl1pPr>
+            <a:lvl2pPr marL="742950" indent="-285750" algn="l" rtl="0" eaLnBrk="1" fontAlgn="base" hangingPunct="1">
+              <a:spcBef>
+                <a:spcPct val="20000"/>
+              </a:spcBef>
+              <a:spcAft>
+                <a:spcPct val="0"/>
+              </a:spcAft>
+              <a:buChar char="–"/>
+              <a:defRPr sz="2400">
+                <a:solidFill>
+                  <a:srgbClr val="000072"/>
+                </a:solidFill>
+                <a:latin typeface="Calibri"/>
+                <a:ea typeface="ＭＳ Ｐゴシック" pitchFamily="34" charset="-128"/>
+                <a:cs typeface="ＭＳ Ｐゴシック"/>
+              </a:defRPr>
+            </a:lvl2pPr>
+            <a:lvl3pPr marL="1143000" indent="-228600" algn="l" rtl="0" eaLnBrk="1" fontAlgn="base" hangingPunct="1">
+              <a:spcBef>
+                <a:spcPct val="20000"/>
+              </a:spcBef>
+              <a:spcAft>
+                <a:spcPct val="0"/>
+              </a:spcAft>
+              <a:buChar char="•"/>
+              <a:defRPr sz="2000">
+                <a:solidFill>
+                  <a:srgbClr val="000072"/>
+                </a:solidFill>
+                <a:latin typeface="Calibri"/>
+                <a:ea typeface="ＭＳ Ｐゴシック" pitchFamily="34" charset="-128"/>
+                <a:cs typeface="ＭＳ Ｐゴシック"/>
+              </a:defRPr>
+            </a:lvl3pPr>
+            <a:lvl4pPr marL="1600200" indent="-228600" algn="l" rtl="0" eaLnBrk="1" fontAlgn="base" hangingPunct="1">
+              <a:spcBef>
+                <a:spcPct val="20000"/>
+              </a:spcBef>
+              <a:spcAft>
+                <a:spcPct val="0"/>
+              </a:spcAft>
+              <a:buChar char="–"/>
+              <a:defRPr sz="2000">
+                <a:solidFill>
+                  <a:schemeClr val="tx1"/>
+                </a:solidFill>
+                <a:latin typeface="Calibri"/>
+                <a:ea typeface="ＭＳ Ｐゴシック" pitchFamily="34" charset="-128"/>
+                <a:cs typeface="ＭＳ Ｐゴシック"/>
+              </a:defRPr>
+            </a:lvl4pPr>
+            <a:lvl5pPr marL="2057400" indent="-228600" algn="l" rtl="0" eaLnBrk="1" fontAlgn="base" hangingPunct="1">
+              <a:spcBef>
+                <a:spcPct val="20000"/>
+              </a:spcBef>
+              <a:spcAft>
+                <a:spcPct val="0"/>
+              </a:spcAft>
+              <a:buChar char="»"/>
+              <a:defRPr sz="2000">
+                <a:solidFill>
+                  <a:schemeClr val="tx1"/>
+                </a:solidFill>
+                <a:latin typeface="Calibri"/>
+                <a:ea typeface="ＭＳ Ｐゴシック" pitchFamily="34" charset="-128"/>
+                <a:cs typeface="ＭＳ Ｐゴシック"/>
+              </a:defRPr>
+            </a:lvl5pPr>
+            <a:lvl6pPr marL="2514600" indent="-228600" algn="l" rtl="0" eaLnBrk="1" fontAlgn="base" hangingPunct="1">
+              <a:spcBef>
+                <a:spcPct val="20000"/>
+              </a:spcBef>
+              <a:spcAft>
+                <a:spcPct val="0"/>
+              </a:spcAft>
+              <a:buChar char="»"/>
+              <a:defRPr sz="2000">
+                <a:solidFill>
+                  <a:schemeClr val="tx1"/>
+                </a:solidFill>
+                <a:latin typeface="+mn-lt"/>
+                <a:ea typeface="+mn-ea"/>
+              </a:defRPr>
+            </a:lvl6pPr>
+            <a:lvl7pPr marL="2971800" indent="-228600" algn="l" rtl="0" eaLnBrk="1" fontAlgn="base" hangingPunct="1">
+              <a:spcBef>
+                <a:spcPct val="20000"/>
+              </a:spcBef>
+              <a:spcAft>
+                <a:spcPct val="0"/>
+              </a:spcAft>
+              <a:buChar char="»"/>
+              <a:defRPr sz="2000">
+                <a:solidFill>
+                  <a:schemeClr val="tx1"/>
+                </a:solidFill>
+                <a:latin typeface="+mn-lt"/>
+                <a:ea typeface="+mn-ea"/>
+              </a:defRPr>
+            </a:lvl7pPr>
+            <a:lvl8pPr marL="3429000" indent="-228600" algn="l" rtl="0" eaLnBrk="1" fontAlgn="base" hangingPunct="1">
+              <a:spcBef>
+                <a:spcPct val="20000"/>
+              </a:spcBef>
+              <a:spcAft>
+                <a:spcPct val="0"/>
+              </a:spcAft>
+              <a:buChar char="»"/>
+              <a:defRPr sz="2000">
+                <a:solidFill>
+                  <a:schemeClr val="tx1"/>
+                </a:solidFill>
+                <a:latin typeface="+mn-lt"/>
+                <a:ea typeface="+mn-ea"/>
+              </a:defRPr>
+            </a:lvl8pPr>
+            <a:lvl9pPr marL="3886200" indent="-228600" algn="l" rtl="0" eaLnBrk="1" fontAlgn="base" hangingPunct="1">
+              <a:spcBef>
+                <a:spcPct val="20000"/>
+              </a:spcBef>
+              <a:spcAft>
+                <a:spcPct val="0"/>
+              </a:spcAft>
+              <a:buChar char="»"/>
+              <a:defRPr sz="2000">
+                <a:solidFill>
+                  <a:schemeClr val="tx1"/>
+                </a:solidFill>
+                <a:latin typeface="+mn-lt"/>
+                <a:ea typeface="+mn-ea"/>
+              </a:defRPr>
+            </a:lvl9pPr>
+          </a:lstStyle>
+          <a:p>
+            <a:pPr marL="0" indent="0">
+              <a:buFontTx/>
+              <a:buNone/>
+            </a:pPr>
+            <a:r>
+              <a:rPr lang="en-US" sz="2000" b="1" dirty="0" smtClean="0"/>
+              <a:t>Doguhan Uluca</a:t>
+            </a:r>
+          </a:p>
+          <a:p>
+            <a:r>
+              <a:rPr lang="en-US" sz="2000" dirty="0" smtClean="0"/>
+              <a:t>Email: </a:t>
+            </a:r>
+            <a:r>
+              <a:rPr lang="en-US" sz="2000" dirty="0" smtClean="0">
+                <a:hlinkClick r:id="rId6"/>
+              </a:rPr>
+              <a:t>doguhan.uluca@excella.com</a:t>
+            </a:r>
+            <a:r>
+              <a:rPr lang="en-US" sz="2000" dirty="0" smtClean="0"/>
+              <a:t> </a:t>
+            </a:r>
+          </a:p>
+          <a:p>
+            <a:r>
+              <a:rPr lang="en-US" sz="2000" dirty="0" smtClean="0"/>
+              <a:t>Twitter: @</a:t>
+            </a:r>
+            <a:r>
+              <a:rPr lang="en-US" sz="2000" dirty="0" err="1" smtClean="0"/>
+              <a:t>duluca</a:t>
+            </a:r>
+            <a:endParaRPr lang="en-US" sz="2000" dirty="0" smtClean="0"/>
+          </a:p>
+          <a:p>
+            <a:r>
+              <a:rPr lang="en-US" sz="2000" dirty="0" smtClean="0"/>
+              <a:t>Web: </a:t>
+            </a:r>
+            <a:r>
+              <a:rPr lang="en-US" sz="2000" dirty="0" smtClean="0">
+                <a:hlinkClick r:id="rId7"/>
+              </a:rPr>
+              <a:t>http://DeceivingArts.com/blog</a:t>
+            </a:r>
+            <a:r>
+              <a:rPr lang="en-US" sz="2000" dirty="0" smtClean="0"/>
+              <a:t>  </a:t>
+            </a:r>
+            <a:endParaRPr lang="en-US" sz="2000" dirty="0"/>
+          </a:p>
+        </p:txBody>
+      </p:sp>
+    </p:spTree>
+    <p:extLst>
+      <p:ext uri="{BB962C8B-B14F-4D97-AF65-F5344CB8AC3E}">
+        <p14:creationId xmlns:p14="http://schemas.microsoft.com/office/powerpoint/2010/main" val="2288945912"/>
+      </p:ext>
+    </p:extLst>
+  </p:cSld>
+  <p:clrMapOvr>
+    <a:masterClrMapping/>
+  </p:clrMapOvr>
+  <p:timing>
+    <p:tnLst>
+      <p:par>
+        <p:cTn id="1" dur="indefinite" restart="never" nodeType="tmRoot"/>
+      </p:par>
+    </p:tnLst>
+  </p:timing>
+</p:sld>
+</file>
+
+<file path=ppt/slides/slide22.xml><?xml version="1.0" encoding="utf-8"?>
+<p:sld xmlns:a="http://schemas.openxmlformats.org/drawingml/2006/main" xmlns:r="http://schemas.openxmlformats.org/officeDocument/2006/relationships" xmlns:p="http://schemas.openxmlformats.org/presentationml/2006/main">
+  <p:cSld>
+    <p:spTree>
+      <p:nvGrpSpPr>
+        <p:cNvPr id="1" name=""/>
+        <p:cNvGrpSpPr/>
+        <p:nvPr/>
+      </p:nvGrpSpPr>
+      <p:grpSpPr>
+        <a:xfrm>
+          <a:off x="0" y="0"/>
+          <a:ext cx="0" cy="0"/>
+          <a:chOff x="0" y="0"/>
+          <a:chExt cx="0" cy="0"/>
+        </a:xfrm>
+      </p:grpSpPr>
+      <p:sp>
+        <p:nvSpPr>
+          <p:cNvPr id="2" name="Title 1"/>
+          <p:cNvSpPr>
+            <a:spLocks noGrp="1"/>
+          </p:cNvSpPr>
+          <p:nvPr>
+            <p:ph type="title"/>
+          </p:nvPr>
+        </p:nvSpPr>
+        <p:spPr/>
+        <p:txBody>
+          <a:bodyPr/>
+          <a:lstStyle/>
+          <a:p>
+            <a:r>
+              <a:rPr lang="en-US" dirty="0" smtClean="0"/>
+              <a:t>Resources</a:t>
+            </a:r>
+            <a:endParaRPr lang="en-US" dirty="0"/>
+          </a:p>
+        </p:txBody>
+      </p:sp>
+      <p:sp>
+        <p:nvSpPr>
+          <p:cNvPr id="3" name="Content Placeholder 2"/>
+          <p:cNvSpPr>
+            <a:spLocks noGrp="1"/>
+          </p:cNvSpPr>
+          <p:nvPr>
+            <p:ph idx="1"/>
+          </p:nvPr>
+        </p:nvSpPr>
+        <p:spPr/>
+        <p:txBody>
+          <a:bodyPr/>
+          <a:lstStyle/>
+          <a:p>
+            <a:r>
+              <a:rPr lang="en-US" dirty="0" smtClean="0"/>
+              <a:t>Migrations: </a:t>
+            </a:r>
+          </a:p>
+          <a:p>
+            <a:r>
+              <a:rPr lang="en-US" dirty="0" err="1" smtClean="0"/>
+              <a:t>Automapper</a:t>
+            </a:r>
+            <a:r>
+              <a:rPr lang="en-US" dirty="0" smtClean="0"/>
+              <a:t>:</a:t>
+            </a:r>
+          </a:p>
+          <a:p>
+            <a:r>
+              <a:rPr lang="en-US" dirty="0" err="1" smtClean="0"/>
+              <a:t>Autofac</a:t>
+            </a:r>
+            <a:r>
+              <a:rPr lang="en-US" dirty="0" smtClean="0"/>
+              <a:t>:</a:t>
+            </a:r>
+          </a:p>
+          <a:p>
+            <a:r>
+              <a:rPr lang="en-US" dirty="0" smtClean="0"/>
+              <a:t>Knockout: </a:t>
+            </a:r>
+          </a:p>
+          <a:p>
+            <a:r>
+              <a:rPr lang="en-US" dirty="0" smtClean="0"/>
+              <a:t>Breeze:</a:t>
+            </a:r>
+          </a:p>
+          <a:p>
+            <a:endParaRPr lang="en-US" dirty="0" smtClean="0"/>
+          </a:p>
+        </p:txBody>
+      </p:sp>
+    </p:spTree>
+    <p:extLst>
+      <p:ext uri="{BB962C8B-B14F-4D97-AF65-F5344CB8AC3E}">
+        <p14:creationId xmlns:p14="http://schemas.microsoft.com/office/powerpoint/2010/main" val="4287056283"/>
+      </p:ext>
+    </p:extLst>
+  </p:cSld>
+  <p:clrMapOvr>
+    <a:masterClrMapping/>
+  </p:clrMapOvr>
+  <p:timing>
+    <p:tnLst>
+      <p:par>
+        <p:cTn id="1" dur="indefinite" restart="never" nodeType="tmRoot"/>
+      </p:par>
+    </p:tnLst>
+  </p:timing>
+</p:sld>
+</file>
+
+<file path=ppt/slides/slide23.xml><?xml version="1.0" encoding="utf-8"?>
+<p:sld xmlns:a="http://schemas.openxmlformats.org/drawingml/2006/main" xmlns:r="http://schemas.openxmlformats.org/officeDocument/2006/relationships" xmlns:p="http://schemas.openxmlformats.org/presentationml/2006/main">
+  <p:cSld>
+    <p:spTree>
+      <p:nvGrpSpPr>
+        <p:cNvPr id="1" name=""/>
+        <p:cNvGrpSpPr/>
+        <p:nvPr/>
+      </p:nvGrpSpPr>
+      <p:grpSpPr>
+        <a:xfrm>
+          <a:off x="0" y="0"/>
+          <a:ext cx="0" cy="0"/>
+          <a:chOff x="0" y="0"/>
+          <a:chExt cx="0" cy="0"/>
+        </a:xfrm>
+      </p:grpSpPr>
+    </p:spTree>
+    <p:extLst>
+      <p:ext uri="{BB962C8B-B14F-4D97-AF65-F5344CB8AC3E}">
+        <p14:creationId xmlns:p14="http://schemas.microsoft.com/office/powerpoint/2010/main" val="2404542755"/>
+      </p:ext>
+    </p:extLst>
+  </p:cSld>
+  <p:clrMapOvr>
+    <a:masterClrMapping/>
+  </p:clrMapOvr>
+  <p:timing>
+    <p:tnLst>
+      <p:par>
+        <p:cTn id="1" dur="indefinite" restart="never" nodeType="tmRoot"/>
+      </p:par>
+    </p:tnLst>
+  </p:timing>
 </p:sld>
 </file>
 
@@ -2075,11 +3947,7 @@
           <a:p>
             <a:r>
               <a:rPr lang="en-US" dirty="0" smtClean="0"/>
-              <a:t>Intro: Options </a:t>
-            </a:r>
-            <a:r>
-              <a:rPr lang="en-US" dirty="0" smtClean="0"/>
-              <a:t>and Alternatives</a:t>
+              <a:t>Intro</a:t>
             </a:r>
             <a:endParaRPr lang="en-US" dirty="0"/>
           </a:p>
@@ -2100,56 +3968,35 @@
           <a:bodyPr/>
           <a:lstStyle/>
           <a:p>
-            <a:r>
-              <a:rPr lang="en-US" dirty="0" smtClean="0"/>
-              <a:t>Database-First (EDMX)</a:t>
-            </a:r>
-          </a:p>
-          <a:p>
-            <a:r>
-              <a:rPr lang="en-US" dirty="0" smtClean="0"/>
-              <a:t>Model-First (visual designer)</a:t>
-            </a:r>
-          </a:p>
-          <a:p>
-            <a:r>
-              <a:rPr lang="en-US" dirty="0"/>
-              <a:t>Code-First with automatic </a:t>
-            </a:r>
-            <a:r>
-              <a:rPr lang="en-US" dirty="0" smtClean="0"/>
-              <a:t>migrations</a:t>
-            </a:r>
-          </a:p>
-          <a:p>
-            <a:r>
-              <a:rPr lang="en-US" dirty="0" smtClean="0"/>
-              <a:t>Code-First with manual </a:t>
-            </a:r>
-            <a:r>
-              <a:rPr lang="en-US" dirty="0" smtClean="0"/>
-              <a:t>migrations</a:t>
-            </a:r>
-          </a:p>
-          <a:p>
-            <a:endParaRPr lang="en-US" dirty="0"/>
-          </a:p>
-          <a:p>
             <a:pPr marL="0" indent="0">
               <a:buNone/>
             </a:pPr>
-            <a:r>
-              <a:rPr lang="en-US" dirty="0" smtClean="0"/>
-              <a:t>(diagrams + explanation)</a:t>
-            </a:r>
-            <a:endParaRPr lang="en-US" dirty="0" smtClean="0"/>
+            <a:endParaRPr lang="en-US" sz="2400" dirty="0"/>
+          </a:p>
+          <a:p>
+            <a:r>
+              <a:rPr lang="en-US" sz="2400" dirty="0" smtClean="0"/>
+              <a:t>(building an enterprise web application with ASP.NET MVC, following best practices for design, development, testability and deployment).</a:t>
+            </a:r>
+          </a:p>
+          <a:p>
+            <a:r>
+              <a:rPr lang="en-US" sz="2400" dirty="0" smtClean="0"/>
+              <a:t>Looking for ways to improve and modernize</a:t>
+            </a:r>
+          </a:p>
+          <a:p>
+            <a:r>
+              <a:rPr lang="en-US" sz="2400" dirty="0" smtClean="0"/>
+              <a:t>The motivation behind this design was our desire to do TDD, BDD, CI, CD.</a:t>
+            </a:r>
           </a:p>
         </p:txBody>
       </p:sp>
     </p:spTree>
     <p:extLst>
       <p:ext uri="{BB962C8B-B14F-4D97-AF65-F5344CB8AC3E}">
-        <p14:creationId xmlns:p14="http://schemas.microsoft.com/office/powerpoint/2010/main" val="3283853887"/>
+        <p14:creationId xmlns:p14="http://schemas.microsoft.com/office/powerpoint/2010/main" val="774763867"/>
       </p:ext>
     </p:extLst>
   </p:cSld>
@@ -2178,7 +4025,42 @@
       </p:grpSpPr>
       <p:sp>
         <p:nvSpPr>
-          <p:cNvPr id="2" name="Title 1"/>
+          <p:cNvPr id="4" name="TextBox 3"/>
+          <p:cNvSpPr txBox="1"/>
+          <p:nvPr/>
+        </p:nvSpPr>
+        <p:spPr>
+          <a:xfrm>
+            <a:off x="381000" y="2514600"/>
+            <a:ext cx="8686800" cy="461665"/>
+          </a:xfrm>
+          <a:prstGeom prst="rect">
+            <a:avLst/>
+          </a:prstGeom>
+          <a:noFill/>
+        </p:spPr>
+        <p:txBody>
+          <a:bodyPr wrap="square" rtlCol="0">
+            <a:spAutoFit/>
+          </a:bodyPr>
+          <a:lstStyle/>
+          <a:p>
+            <a:pPr algn="ctr"/>
+            <a:r>
+              <a:rPr lang="en-US" dirty="0" smtClean="0"/>
+              <a:t>By Shahed </a:t>
+            </a:r>
+            <a:r>
+              <a:rPr lang="en-US" dirty="0" smtClean="0"/>
+              <a:t>Chowdhuri</a:t>
+            </a:r>
+            <a:endParaRPr lang="en-US" dirty="0"/>
+          </a:p>
+        </p:txBody>
+      </p:sp>
+      <p:sp>
+        <p:nvSpPr>
+          <p:cNvPr id="7" name="Title 1"/>
           <p:cNvSpPr>
             <a:spLocks noGrp="1"/>
           </p:cNvSpPr>
@@ -2186,126 +4068,28 @@
             <p:ph type="title"/>
           </p:nvPr>
         </p:nvSpPr>
-        <p:spPr/>
+        <p:spPr>
+          <a:xfrm>
+            <a:off x="609600" y="274638"/>
+            <a:ext cx="8001000" cy="1143000"/>
+          </a:xfrm>
+        </p:spPr>
         <p:txBody>
           <a:bodyPr/>
           <a:lstStyle/>
           <a:p>
             <a:r>
-              <a:rPr lang="en-US" dirty="0" smtClean="0"/>
-              <a:t>Agenda</a:t>
-            </a:r>
-            <a:endParaRPr lang="en-US" dirty="0"/>
-          </a:p>
-        </p:txBody>
-      </p:sp>
-      <p:sp>
-        <p:nvSpPr>
-          <p:cNvPr id="3" name="Content Placeholder 2"/>
-          <p:cNvSpPr>
-            <a:spLocks noGrp="1"/>
-          </p:cNvSpPr>
-          <p:nvPr>
-            <p:ph idx="1"/>
-          </p:nvPr>
-        </p:nvSpPr>
-        <p:spPr/>
-        <p:txBody>
-          <a:bodyPr/>
-          <a:lstStyle/>
-          <a:p>
-            <a:pPr marL="0" indent="0">
-              <a:buNone/>
-            </a:pPr>
-            <a:r>
-              <a:rPr lang="en-US" dirty="0" smtClean="0"/>
-              <a:t>(window-pane grid here with 6 nuggets)</a:t>
-            </a:r>
-          </a:p>
-          <a:p>
-            <a:pPr marL="914400" lvl="1" indent="-457200">
-              <a:buFont typeface="+mj-lt"/>
-              <a:buAutoNum type="arabicPeriod"/>
-            </a:pPr>
-            <a:r>
-              <a:rPr lang="en-US" dirty="0" smtClean="0"/>
-              <a:t>Add models and mapping in code</a:t>
-            </a:r>
-          </a:p>
-          <a:p>
-            <a:pPr marL="914400" lvl="1" indent="-457200">
-              <a:buFont typeface="+mj-lt"/>
-              <a:buAutoNum type="arabicPeriod"/>
-            </a:pPr>
-            <a:r>
-              <a:rPr lang="en-US" dirty="0" smtClean="0"/>
-              <a:t>Connection String</a:t>
-            </a:r>
-          </a:p>
-          <a:p>
-            <a:pPr marL="914400" lvl="1" indent="-457200">
-              <a:buFont typeface="+mj-lt"/>
-              <a:buAutoNum type="arabicPeriod"/>
-            </a:pPr>
-            <a:r>
-              <a:rPr lang="en-US" dirty="0" smtClean="0"/>
-              <a:t>Enable Migrations</a:t>
-            </a:r>
-          </a:p>
-          <a:p>
-            <a:pPr marL="914400" lvl="1" indent="-457200">
-              <a:buFont typeface="+mj-lt"/>
-              <a:buAutoNum type="arabicPeriod"/>
-            </a:pPr>
-            <a:r>
-              <a:rPr lang="en-US" dirty="0" smtClean="0"/>
-              <a:t>Update Database</a:t>
-            </a:r>
-          </a:p>
-          <a:p>
-            <a:pPr marL="914400" lvl="1" indent="-457200">
-              <a:buFont typeface="+mj-lt"/>
-              <a:buAutoNum type="arabicPeriod"/>
-            </a:pPr>
-            <a:r>
-              <a:rPr lang="en-US" dirty="0" smtClean="0"/>
-              <a:t>Push code + Migrate server DB</a:t>
-            </a:r>
-          </a:p>
-          <a:p>
-            <a:pPr marL="914400" lvl="1" indent="-457200">
-              <a:buFont typeface="+mj-lt"/>
-              <a:buAutoNum type="arabicPeriod"/>
-            </a:pPr>
-            <a:r>
-              <a:rPr lang="en-US" dirty="0" smtClean="0"/>
-              <a:t>Process Workflow</a:t>
-            </a:r>
-          </a:p>
-          <a:p>
-            <a:pPr marL="914400" lvl="1" indent="-457200">
-              <a:buFont typeface="+mj-lt"/>
-              <a:buAutoNum type="arabicPeriod"/>
-            </a:pPr>
-            <a:endParaRPr lang="en-US" dirty="0" smtClean="0"/>
-          </a:p>
-          <a:p>
-            <a:pPr marL="914400" lvl="1" indent="-457200">
-              <a:buFont typeface="+mj-lt"/>
-              <a:buAutoNum type="arabicPeriod"/>
-            </a:pPr>
-            <a:endParaRPr lang="en-US" dirty="0" smtClean="0"/>
-          </a:p>
-          <a:p>
-            <a:pPr lvl="1"/>
-            <a:endParaRPr lang="en-US" dirty="0"/>
+              <a:rPr lang="en-US" sz="6600" dirty="0" smtClean="0"/>
+              <a:t>DAL</a:t>
+            </a:r>
+            <a:endParaRPr lang="en-US" sz="6600" dirty="0"/>
           </a:p>
         </p:txBody>
       </p:sp>
     </p:spTree>
     <p:extLst>
       <p:ext uri="{BB962C8B-B14F-4D97-AF65-F5344CB8AC3E}">
-        <p14:creationId xmlns:p14="http://schemas.microsoft.com/office/powerpoint/2010/main" val="1467393609"/>
+        <p14:creationId xmlns:p14="http://schemas.microsoft.com/office/powerpoint/2010/main" val="1175708312"/>
       </p:ext>
     </p:extLst>
   </p:cSld>
@@ -2349,7 +4133,7 @@
           <a:p>
             <a:r>
               <a:rPr lang="en-US" dirty="0" smtClean="0"/>
-              <a:t>1 of 6: </a:t>
+              <a:t>Tech Check</a:t>
             </a:r>
             <a:endParaRPr lang="en-US" dirty="0"/>
           </a:p>
@@ -2372,28 +4156,69 @@
           <a:p>
             <a:r>
               <a:rPr lang="en-US" dirty="0" smtClean="0"/>
-              <a:t>Models and Mapping in Code</a:t>
-            </a:r>
-          </a:p>
-          <a:p>
-            <a:r>
-              <a:rPr lang="en-US" dirty="0" smtClean="0"/>
-              <a:t>Object-Model Relationships</a:t>
-            </a:r>
+              <a:t>Are you familiar with:</a:t>
+            </a:r>
+          </a:p>
+          <a:p>
+            <a:pPr lvl="1"/>
+            <a:r>
+              <a:rPr lang="en-US" dirty="0" smtClean="0"/>
+              <a:t>ASP.NET MVC?</a:t>
+            </a:r>
+          </a:p>
+          <a:p>
+            <a:pPr lvl="1"/>
+            <a:r>
+              <a:rPr lang="en-US" dirty="0" smtClean="0"/>
+              <a:t>Entity Framework?</a:t>
+            </a:r>
+          </a:p>
+          <a:p>
+            <a:pPr lvl="1"/>
+            <a:r>
+              <a:rPr lang="en-US" dirty="0" smtClean="0"/>
+              <a:t>Code First development?</a:t>
+            </a:r>
+          </a:p>
+          <a:p>
+            <a:pPr lvl="1"/>
+            <a:r>
+              <a:rPr lang="en-US" dirty="0" smtClean="0"/>
+              <a:t>Code First Migrations?</a:t>
+            </a:r>
+          </a:p>
+          <a:p>
+            <a:pPr lvl="1"/>
             <a:endParaRPr lang="en-US" dirty="0"/>
+          </a:p>
+          <a:p>
+            <a:pPr marL="457200" lvl="1" indent="0">
+              <a:buNone/>
+            </a:pPr>
+            <a:r>
+              <a:rPr lang="en-US" dirty="0" smtClean="0"/>
+              <a:t>(slow-reveal diagram + ask the audience)</a:t>
+            </a:r>
           </a:p>
         </p:txBody>
       </p:sp>
     </p:spTree>
     <p:extLst>
       <p:ext uri="{BB962C8B-B14F-4D97-AF65-F5344CB8AC3E}">
-        <p14:creationId xmlns:p14="http://schemas.microsoft.com/office/powerpoint/2010/main" val="3185315970"/>
+        <p14:creationId xmlns:p14="http://schemas.microsoft.com/office/powerpoint/2010/main" val="1156631515"/>
       </p:ext>
     </p:extLst>
   </p:cSld>
   <p:clrMapOvr>
     <a:masterClrMapping/>
   </p:clrMapOvr>
+  <p:timing>
+    <p:tnLst>
+      <p:par>
+        <p:cTn id="1" dur="indefinite" restart="never" nodeType="tmRoot"/>
+      </p:par>
+    </p:tnLst>
+  </p:timing>
 </p:sld>
 </file>
 
@@ -2430,12 +4255,8 @@
           <a:lstStyle/>
           <a:p>
             <a:r>
-              <a:rPr lang="en-US" dirty="0"/>
-              <a:t>2</a:t>
-            </a:r>
-            <a:r>
-              <a:rPr lang="en-US" dirty="0" smtClean="0"/>
-              <a:t> of 6: </a:t>
+              <a:rPr lang="en-US" dirty="0" smtClean="0"/>
+              <a:t>Intro: Options and Alternatives</a:t>
             </a:r>
             <a:endParaRPr lang="en-US" dirty="0"/>
           </a:p>
@@ -2458,49 +4279,62 @@
           <a:p>
             <a:r>
               <a:rPr lang="en-US" dirty="0" smtClean="0"/>
-              <a:t>Connection String</a:t>
-            </a:r>
-          </a:p>
-          <a:p>
-            <a:r>
-              <a:rPr lang="en-US" dirty="0" err="1" smtClean="0"/>
-              <a:t>Web.config</a:t>
-            </a:r>
-            <a:r>
-              <a:rPr lang="en-US" dirty="0" smtClean="0"/>
-              <a:t> </a:t>
-            </a:r>
-          </a:p>
-          <a:p>
-            <a:r>
-              <a:rPr lang="en-US" dirty="0" err="1" smtClean="0"/>
-              <a:t>configSource</a:t>
-            </a:r>
-            <a:endParaRPr lang="en-US" dirty="0" smtClean="0"/>
-          </a:p>
-          <a:p>
-            <a:r>
-              <a:rPr lang="en-US" dirty="0" smtClean="0"/>
-              <a:t>Machine </a:t>
-            </a:r>
-            <a:r>
-              <a:rPr lang="en-US" dirty="0" err="1" smtClean="0"/>
-              <a:t>config</a:t>
-            </a:r>
+              <a:t>Database-First (EDMX)</a:t>
+            </a:r>
+          </a:p>
+          <a:p>
+            <a:r>
+              <a:rPr lang="en-US" dirty="0" smtClean="0"/>
+              <a:t>Model-First (visual designer)</a:t>
+            </a:r>
+          </a:p>
+          <a:p>
+            <a:r>
+              <a:rPr lang="en-US" dirty="0"/>
+              <a:t>Code-First with automatic </a:t>
+            </a:r>
+            <a:r>
+              <a:rPr lang="en-US" dirty="0" smtClean="0"/>
+              <a:t>migrations</a:t>
+            </a:r>
+          </a:p>
+          <a:p>
+            <a:r>
+              <a:rPr lang="en-US" dirty="0" smtClean="0"/>
+              <a:t>Code-First with manual migrations</a:t>
+            </a:r>
+          </a:p>
+          <a:p>
             <a:endParaRPr lang="en-US" dirty="0"/>
+          </a:p>
+          <a:p>
+            <a:pPr marL="0" indent="0">
+              <a:buNone/>
+            </a:pPr>
+            <a:r>
+              <a:rPr lang="en-US" dirty="0" smtClean="0"/>
+              <a:t>(diagrams + explanation)</a:t>
+            </a:r>
           </a:p>
         </p:txBody>
       </p:sp>
     </p:spTree>
     <p:extLst>
       <p:ext uri="{BB962C8B-B14F-4D97-AF65-F5344CB8AC3E}">
-        <p14:creationId xmlns:p14="http://schemas.microsoft.com/office/powerpoint/2010/main" val="1470060015"/>
+        <p14:creationId xmlns:p14="http://schemas.microsoft.com/office/powerpoint/2010/main" val="3283853887"/>
       </p:ext>
     </p:extLst>
   </p:cSld>
   <p:clrMapOvr>
     <a:masterClrMapping/>
   </p:clrMapOvr>
+  <p:timing>
+    <p:tnLst>
+      <p:par>
+        <p:cTn id="1" dur="indefinite" restart="never" nodeType="tmRoot"/>
+      </p:par>
+    </p:tnLst>
+  </p:timing>
 </p:sld>
 </file>
 
@@ -2537,12 +4371,8 @@
           <a:lstStyle/>
           <a:p>
             <a:r>
-              <a:rPr lang="en-US" dirty="0"/>
-              <a:t>3</a:t>
-            </a:r>
-            <a:r>
-              <a:rPr lang="en-US" dirty="0" smtClean="0"/>
-              <a:t> of 6: </a:t>
+              <a:rPr lang="en-US" dirty="0" smtClean="0"/>
+              <a:t>Agenda</a:t>
             </a:r>
             <a:endParaRPr lang="en-US" dirty="0"/>
           </a:p>
@@ -2563,23 +4393,90 @@
           <a:bodyPr/>
           <a:lstStyle/>
           <a:p>
+            <a:pPr marL="0" indent="0">
+              <a:buNone/>
+            </a:pPr>
+            <a:r>
+              <a:rPr lang="en-US" dirty="0" smtClean="0"/>
+              <a:t>(window-pane grid here with 6 nuggets)</a:t>
+            </a:r>
+          </a:p>
+          <a:p>
+            <a:pPr marL="914400" lvl="1" indent="-457200">
+              <a:buFont typeface="+mj-lt"/>
+              <a:buAutoNum type="arabicPeriod"/>
+            </a:pPr>
+            <a:r>
+              <a:rPr lang="en-US" dirty="0" smtClean="0"/>
+              <a:t>Add models and mapping in code</a:t>
+            </a:r>
+          </a:p>
+          <a:p>
+            <a:pPr marL="914400" lvl="1" indent="-457200">
+              <a:buFont typeface="+mj-lt"/>
+              <a:buAutoNum type="arabicPeriod"/>
+            </a:pPr>
+            <a:r>
+              <a:rPr lang="en-US" dirty="0" smtClean="0"/>
+              <a:t>Connection String</a:t>
+            </a:r>
+          </a:p>
+          <a:p>
+            <a:pPr marL="914400" lvl="1" indent="-457200">
+              <a:buFont typeface="+mj-lt"/>
+              <a:buAutoNum type="arabicPeriod"/>
+            </a:pPr>
             <a:r>
               <a:rPr lang="en-US" dirty="0" smtClean="0"/>
               <a:t>Enable Migrations</a:t>
             </a:r>
           </a:p>
           <a:p>
-            <a:r>
-              <a:rPr lang="en-US" dirty="0" err="1" smtClean="0"/>
-              <a:t>Configuration.cs</a:t>
-            </a:r>
+            <a:pPr marL="914400" lvl="1" indent="-457200">
+              <a:buFont typeface="+mj-lt"/>
+              <a:buAutoNum type="arabicPeriod"/>
+            </a:pPr>
+            <a:r>
+              <a:rPr lang="en-US" dirty="0" smtClean="0"/>
+              <a:t>Update Database</a:t>
+            </a:r>
+          </a:p>
+          <a:p>
+            <a:pPr marL="914400" lvl="1" indent="-457200">
+              <a:buFont typeface="+mj-lt"/>
+              <a:buAutoNum type="arabicPeriod"/>
+            </a:pPr>
+            <a:r>
+              <a:rPr lang="en-US" dirty="0" smtClean="0"/>
+              <a:t>Push code + Migrate server DB</a:t>
+            </a:r>
+          </a:p>
+          <a:p>
+            <a:pPr marL="914400" lvl="1" indent="-457200">
+              <a:buFont typeface="+mj-lt"/>
+              <a:buAutoNum type="arabicPeriod"/>
+            </a:pPr>
+            <a:r>
+              <a:rPr lang="en-US" dirty="0" smtClean="0"/>
+              <a:t>Process Workflow</a:t>
+            </a:r>
+          </a:p>
+          <a:p>
+            <a:pPr marL="914400" lvl="1" indent="-457200">
+              <a:buFont typeface="+mj-lt"/>
+              <a:buAutoNum type="arabicPeriod"/>
+            </a:pPr>
             <a:endParaRPr lang="en-US" dirty="0" smtClean="0"/>
           </a:p>
           <a:p>
-            <a:r>
-              <a:rPr lang="en-US" dirty="0" smtClean="0"/>
-              <a:t>Add Seed data</a:t>
-            </a:r>
+            <a:pPr marL="914400" lvl="1" indent="-457200">
+              <a:buFont typeface="+mj-lt"/>
+              <a:buAutoNum type="arabicPeriod"/>
+            </a:pPr>
+            <a:endParaRPr lang="en-US" dirty="0" smtClean="0"/>
+          </a:p>
+          <a:p>
+            <a:pPr lvl="1"/>
             <a:endParaRPr lang="en-US" dirty="0"/>
           </a:p>
         </p:txBody>
@@ -2587,13 +4484,20 @@
     </p:spTree>
     <p:extLst>
       <p:ext uri="{BB962C8B-B14F-4D97-AF65-F5344CB8AC3E}">
-        <p14:creationId xmlns:p14="http://schemas.microsoft.com/office/powerpoint/2010/main" val="1950871537"/>
+        <p14:creationId xmlns:p14="http://schemas.microsoft.com/office/powerpoint/2010/main" val="1467393609"/>
       </p:ext>
     </p:extLst>
   </p:cSld>
   <p:clrMapOvr>
     <a:masterClrMapping/>
   </p:clrMapOvr>
+  <p:timing>
+    <p:tnLst>
+      <p:par>
+        <p:cTn id="1" dur="indefinite" restart="never" nodeType="tmRoot"/>
+      </p:par>
+    </p:tnLst>
+  </p:timing>
 </p:sld>
 </file>
 
@@ -2630,12 +4534,8 @@
           <a:lstStyle/>
           <a:p>
             <a:r>
-              <a:rPr lang="en-US" dirty="0"/>
-              <a:t>4</a:t>
-            </a:r>
-            <a:r>
-              <a:rPr lang="en-US" dirty="0" smtClean="0"/>
-              <a:t> of 6: </a:t>
+              <a:rPr lang="en-US" dirty="0" smtClean="0"/>
+              <a:t>1 of 6: </a:t>
             </a:r>
             <a:endParaRPr lang="en-US" dirty="0"/>
           </a:p>
@@ -2658,25 +4558,13 @@
           <a:p>
             <a:r>
               <a:rPr lang="en-US" dirty="0" smtClean="0"/>
-              <a:t>Update Database</a:t>
-            </a:r>
-          </a:p>
-          <a:p>
-            <a:r>
-              <a:rPr lang="en-US" dirty="0" smtClean="0"/>
-              <a:t>Run Seed Data</a:t>
-            </a:r>
-          </a:p>
-          <a:p>
-            <a:r>
-              <a:rPr lang="en-US" dirty="0" smtClean="0"/>
-              <a:t>Verify SQL</a:t>
-            </a:r>
-          </a:p>
-          <a:p>
-            <a:r>
-              <a:rPr lang="en-US" dirty="0" smtClean="0"/>
-              <a:t>Verify DB</a:t>
+              <a:t>Models and Mapping in Code</a:t>
+            </a:r>
+          </a:p>
+          <a:p>
+            <a:r>
+              <a:rPr lang="en-US" dirty="0" smtClean="0"/>
+              <a:t>Object-Model Relationships</a:t>
             </a:r>
             <a:endParaRPr lang="en-US" dirty="0"/>
           </a:p>
@@ -2685,13 +4573,20 @@
     </p:spTree>
     <p:extLst>
       <p:ext uri="{BB962C8B-B14F-4D97-AF65-F5344CB8AC3E}">
-        <p14:creationId xmlns:p14="http://schemas.microsoft.com/office/powerpoint/2010/main" val="2059606158"/>
+        <p14:creationId xmlns:p14="http://schemas.microsoft.com/office/powerpoint/2010/main" val="3185315970"/>
       </p:ext>
     </p:extLst>
   </p:cSld>
   <p:clrMapOvr>
     <a:masterClrMapping/>
   </p:clrMapOvr>
+  <p:timing>
+    <p:tnLst>
+      <p:par>
+        <p:cTn id="1" dur="indefinite" restart="never" nodeType="tmRoot"/>
+      </p:par>
+    </p:tnLst>
+  </p:timing>
 </p:sld>
 </file>
 
@@ -2728,8 +4623,12 @@
           <a:lstStyle/>
           <a:p>
             <a:r>
-              <a:rPr lang="en-US" dirty="0" smtClean="0"/>
-              <a:t>5 of 6: </a:t>
+              <a:rPr lang="en-US" dirty="0"/>
+              <a:t>2</a:t>
+            </a:r>
+            <a:r>
+              <a:rPr lang="en-US" dirty="0" smtClean="0"/>
+              <a:t> of 6: </a:t>
             </a:r>
             <a:endParaRPr lang="en-US" dirty="0"/>
           </a:p>
@@ -2752,47 +4651,56 @@
           <a:p>
             <a:r>
               <a:rPr lang="en-US" dirty="0" smtClean="0"/>
-              <a:t>Push code to source control</a:t>
-            </a:r>
-          </a:p>
-          <a:p>
-            <a:r>
-              <a:rPr lang="en-US" dirty="0" smtClean="0"/>
-              <a:t>Other developers pull and Update Database</a:t>
-            </a:r>
-          </a:p>
-          <a:p>
-            <a:r>
-              <a:rPr lang="en-US" dirty="0" smtClean="0"/>
-              <a:t>Migrate server DB via migrate.exe</a:t>
-            </a:r>
-          </a:p>
-          <a:p>
-            <a:r>
-              <a:rPr lang="en-US" dirty="0" smtClean="0"/>
-              <a:t>Use </a:t>
-            </a:r>
+              <a:t>Connection String</a:t>
+            </a:r>
+          </a:p>
+          <a:p>
             <a:r>
               <a:rPr lang="en-US" dirty="0" err="1" smtClean="0"/>
-              <a:t>TeamCity</a:t>
-            </a:r>
-            <a:r>
-              <a:rPr lang="en-US" dirty="0" smtClean="0"/>
-              <a:t> to automate this</a:t>
-            </a:r>
+              <a:t>Web.config</a:t>
+            </a:r>
+            <a:r>
+              <a:rPr lang="en-US" dirty="0" smtClean="0"/>
+              <a:t> </a:t>
+            </a:r>
+          </a:p>
+          <a:p>
+            <a:r>
+              <a:rPr lang="en-US" dirty="0" err="1" smtClean="0"/>
+              <a:t>configSource</a:t>
+            </a:r>
+            <a:endParaRPr lang="en-US" dirty="0" smtClean="0"/>
+          </a:p>
+          <a:p>
+            <a:r>
+              <a:rPr lang="en-US" dirty="0" smtClean="0"/>
+              <a:t>Machine </a:t>
+            </a:r>
+            <a:r>
+              <a:rPr lang="en-US" dirty="0" err="1" smtClean="0"/>
+              <a:t>config</a:t>
+            </a:r>
+            <a:endParaRPr lang="en-US" dirty="0"/>
           </a:p>
         </p:txBody>
       </p:sp>
     </p:spTree>
     <p:extLst>
       <p:ext uri="{BB962C8B-B14F-4D97-AF65-F5344CB8AC3E}">
-        <p14:creationId xmlns:p14="http://schemas.microsoft.com/office/powerpoint/2010/main" val="4246540840"/>
+        <p14:creationId xmlns:p14="http://schemas.microsoft.com/office/powerpoint/2010/main" val="1470060015"/>
       </p:ext>
     </p:extLst>
   </p:cSld>
   <p:clrMapOvr>
     <a:masterClrMapping/>
   </p:clrMapOvr>
+  <p:timing>
+    <p:tnLst>
+      <p:par>
+        <p:cTn id="1" dur="indefinite" restart="never" nodeType="tmRoot"/>
+      </p:par>
+    </p:tnLst>
+  </p:timing>
 </p:sld>
 </file>
 
@@ -3700,7 +5608,7 @@
   </a:extraClrSchemeLst>
   <a:extLst>
     <a:ext uri="{05A4C25C-085E-4340-85A3-A5531E510DB2}">
-      <thm15:themeFamily xmlns="" xmlns:thm15="http://schemas.microsoft.com/office/thememl/2012/main" name="Excella" id="{9A5F6432-036B-4B94-AD11-BE20D0494622}" vid="{7466CE9E-D5DB-4024-BB33-EA4F022184C8}"/>
+      <thm15:themeFamily xmlns:thm15="http://schemas.microsoft.com/office/thememl/2012/main" xmlns="" name="Excella" id="{9A5F6432-036B-4B94-AD11-BE20D0494622}" vid="{7466CE9E-D5DB-4024-BB33-EA4F022184C8}"/>
     </a:ext>
   </a:extLst>
 </a:theme>

</xml_diff>